<commit_message>
Small fix to first slide
</commit_message>
<xml_diff>
--- a/dscp_le-hackathon104.pptx
+++ b/dscp_le-hackathon104.pptx
@@ -237,7 +237,7 @@
           <a:bodyPr lIns="0" rIns="0" tIns="0" bIns="0" anchor="b"/>
           <a:p>
             <a:pPr algn="r"/>
-            <a:fld id="{79910C9F-B7D6-4197-90E5-EE4EAFFA31E2}" type="slidenum">
+            <a:fld id="{69D8466E-3DBC-4961-A7DC-F03D2CF18B1C}" type="slidenum">
               <a:rPr b="0" lang="en-US" sz="1400" spc="-1" strike="noStrike">
                 <a:latin typeface="Times New Roman"/>
               </a:rPr>
@@ -347,7 +347,7 @@
                 <a:spcPct val="100000"/>
               </a:lnSpc>
             </a:pPr>
-            <a:fld id="{FA4E3CDA-72D1-4E7C-84D4-43E3F3497911}" type="slidenum">
+            <a:fld id="{98A089AE-5F2B-49E6-B67A-59F4BA6BB680}" type="slidenum">
               <a:rPr b="0" lang="en-US" sz="1800" spc="-1" strike="noStrike">
                 <a:solidFill>
                   <a:srgbClr val="000000"/>
@@ -3515,7 +3515,7 @@
                 <a:spcPct val="100000"/>
               </a:lnSpc>
             </a:pPr>
-            <a:fld id="{71F25C52-17E1-4330-B317-A683A39C4404}" type="slidenum">
+            <a:fld id="{C145B86B-3E8D-4221-B202-ED3A77765BD9}" type="slidenum">
               <a:rPr b="0" lang="en-US" sz="1200" spc="-1" strike="noStrike">
                 <a:solidFill>
                   <a:srgbClr val="888888"/>
@@ -3875,7 +3875,7 @@
                 <a:spcPct val="100000"/>
               </a:lnSpc>
             </a:pPr>
-            <a:fld id="{AE57BF80-4BBF-4AE8-912D-73BE7E4469D2}" type="slidenum">
+            <a:fld id="{0B61A0D9-0B72-4215-802D-30E6F6DFDBCF}" type="slidenum">
               <a:rPr b="0" lang="en-US" sz="1200" spc="-1" strike="noStrike">
                 <a:solidFill>
                   <a:srgbClr val="888888"/>
@@ -3976,7 +3976,7 @@
                 <a:latin typeface="Calibri"/>
                 <a:ea typeface="Calibri"/>
               </a:rPr>
-              <a:t>&lt;DSCP LE&gt;</a:t>
+              <a:t>DSCP LE</a:t>
             </a:r>
             <a:endParaRPr b="0" lang="en-US" sz="4400" spc="-1" strike="noStrike">
               <a:solidFill>
@@ -4357,7 +4357,7 @@
                 <a:spcPct val="100000"/>
               </a:lnSpc>
             </a:pPr>
-            <a:fld id="{013F9185-51C5-45C7-ACD5-2F9E33248C31}" type="slidenum">
+            <a:fld id="{55154D75-8715-403D-9B98-B9E1182C55C2}" type="slidenum">
               <a:rPr b="0" lang="en-US" sz="1200" spc="-1" strike="noStrike">
                 <a:solidFill>
                   <a:srgbClr val="888888"/>
@@ -4601,7 +4601,7 @@
                 <a:spcPct val="100000"/>
               </a:lnSpc>
             </a:pPr>
-            <a:fld id="{374F3ACB-5381-484B-AC0C-CF10DFA70222}" type="slidenum">
+            <a:fld id="{435FFF4C-13E7-43EE-9AEB-4E0D17586B20}" type="slidenum">
               <a:rPr b="0" lang="en-US" sz="1200" spc="-1" strike="noStrike">
                 <a:solidFill>
                   <a:srgbClr val="888888"/>
@@ -4855,7 +4855,7 @@
                 <a:spcPct val="100000"/>
               </a:lnSpc>
             </a:pPr>
-            <a:fld id="{7122D833-A358-4AED-87F4-3E39679CEE72}" type="slidenum">
+            <a:fld id="{4EA758CD-099A-49FE-A311-791ECDAF834A}" type="slidenum">
               <a:rPr b="0" lang="en-US" sz="1200" spc="-1" strike="noStrike">
                 <a:solidFill>
                   <a:srgbClr val="888888"/>
@@ -5213,7 +5213,7 @@
                 <a:spcPct val="100000"/>
               </a:lnSpc>
             </a:pPr>
-            <a:fld id="{0BE13BE0-FE81-436E-893F-3C0F12F71FE9}" type="slidenum">
+            <a:fld id="{C61515D9-0B06-4331-A36A-3BDCBCBBABDB}" type="slidenum">
               <a:rPr b="0" lang="en-US" sz="1200" spc="-1" strike="noStrike">
                 <a:solidFill>
                   <a:srgbClr val="888888"/>

</xml_diff>

<commit_message>
Update slides for DSCP LE
</commit_message>
<xml_diff>
--- a/dscp_le-hackathon104.pptx
+++ b/dscp_le-hackathon104.pptx
@@ -39,7 +39,7 @@
       </p:grpSpPr>
       <p:sp>
         <p:nvSpPr>
-          <p:cNvPr id="80" name="PlaceHolder 1"/>
+          <p:cNvPr id="78" name="PlaceHolder 1"/>
           <p:cNvSpPr>
             <a:spLocks noGrp="1"/>
           </p:cNvSpPr>
@@ -59,27 +59,22 @@
         <p:txBody>
           <a:bodyPr lIns="0" rIns="0" tIns="0" bIns="0" anchor="ctr"/>
           <a:p>
+            <a:pPr algn="ctr"/>
             <a:r>
-              <a:rPr b="0" lang="en-US" sz="1800" spc="-1" strike="noStrike">
-                <a:solidFill>
-                  <a:srgbClr val="000000"/>
-                </a:solidFill>
-                <a:latin typeface="Calibri"/>
+              <a:rPr b="0" lang="en-US" sz="4400" spc="-1" strike="noStrike">
+                <a:latin typeface="Arial"/>
               </a:rPr>
               <a:t>Click to move the slide</a:t>
             </a:r>
-            <a:endParaRPr b="0" lang="en-US" sz="1800" spc="-1" strike="noStrike">
-              <a:solidFill>
-                <a:srgbClr val="000000"/>
-              </a:solidFill>
-              <a:latin typeface="Calibri"/>
-            </a:endParaRPr>
-          </a:p>
-        </p:txBody>
-      </p:sp>
-      <p:sp>
-        <p:nvSpPr>
-          <p:cNvPr id="81" name="PlaceHolder 2"/>
+            <a:endParaRPr b="0" lang="en-US" sz="4400" spc="-1" strike="noStrike">
+              <a:latin typeface="Arial"/>
+            </a:endParaRPr>
+          </a:p>
+        </p:txBody>
+      </p:sp>
+      <p:sp>
+        <p:nvSpPr>
+          <p:cNvPr id="79" name="PlaceHolder 2"/>
           <p:cNvSpPr>
             <a:spLocks noGrp="1"/>
           </p:cNvSpPr>
@@ -113,7 +108,7 @@
       </p:sp>
       <p:sp>
         <p:nvSpPr>
-          <p:cNvPr id="82" name="PlaceHolder 3"/>
+          <p:cNvPr id="80" name="PlaceHolder 3"/>
           <p:cNvSpPr>
             <a:spLocks noGrp="1"/>
           </p:cNvSpPr>
@@ -137,7 +132,7 @@
               <a:rPr b="0" lang="en-US" sz="1400" spc="-1" strike="noStrike">
                 <a:latin typeface="Times New Roman"/>
               </a:rPr>
-              <a:t> </a:t>
+              <a:t>&lt;header&gt;</a:t>
             </a:r>
             <a:endParaRPr b="0" lang="en-US" sz="1400" spc="-1" strike="noStrike">
               <a:latin typeface="Times New Roman"/>
@@ -147,7 +142,7 @@
       </p:sp>
       <p:sp>
         <p:nvSpPr>
-          <p:cNvPr id="83" name="PlaceHolder 4"/>
+          <p:cNvPr id="81" name="PlaceHolder 4"/>
           <p:cNvSpPr>
             <a:spLocks noGrp="1"/>
           </p:cNvSpPr>
@@ -172,7 +167,7 @@
               <a:rPr b="0" lang="en-US" sz="1400" spc="-1" strike="noStrike">
                 <a:latin typeface="Times New Roman"/>
               </a:rPr>
-              <a:t> </a:t>
+              <a:t>&lt;date/time&gt;</a:t>
             </a:r>
             <a:endParaRPr b="0" lang="en-US" sz="1400" spc="-1" strike="noStrike">
               <a:latin typeface="Times New Roman"/>
@@ -182,7 +177,7 @@
       </p:sp>
       <p:sp>
         <p:nvSpPr>
-          <p:cNvPr id="84" name="PlaceHolder 5"/>
+          <p:cNvPr id="82" name="PlaceHolder 5"/>
           <p:cNvSpPr>
             <a:spLocks noGrp="1"/>
           </p:cNvSpPr>
@@ -206,7 +201,7 @@
               <a:rPr b="0" lang="en-US" sz="1400" spc="-1" strike="noStrike">
                 <a:latin typeface="Times New Roman"/>
               </a:rPr>
-              <a:t> </a:t>
+              <a:t>&lt;footer&gt;</a:t>
             </a:r>
             <a:endParaRPr b="0" lang="en-US" sz="1400" spc="-1" strike="noStrike">
               <a:latin typeface="Times New Roman"/>
@@ -216,7 +211,7 @@
       </p:sp>
       <p:sp>
         <p:nvSpPr>
-          <p:cNvPr id="85" name="PlaceHolder 6"/>
+          <p:cNvPr id="83" name="PlaceHolder 6"/>
           <p:cNvSpPr>
             <a:spLocks noGrp="1"/>
           </p:cNvSpPr>
@@ -237,11 +232,11 @@
           <a:bodyPr lIns="0" rIns="0" tIns="0" bIns="0" anchor="b"/>
           <a:p>
             <a:pPr algn="r"/>
-            <a:fld id="{69D8466E-3DBC-4961-A7DC-F03D2CF18B1C}" type="slidenum">
+            <a:fld id="{F6C8D6B5-9539-4185-9E85-FEDF434ACA34}" type="slidenum">
               <a:rPr b="0" lang="en-US" sz="1400" spc="-1" strike="noStrike">
                 <a:latin typeface="Times New Roman"/>
               </a:rPr>
-              <a:t>1</a:t>
+              <a:t>&lt;number&gt;</a:t>
             </a:fld>
             <a:endParaRPr b="0" lang="en-US" sz="1400" spc="-1" strike="noStrike">
               <a:latin typeface="Times New Roman"/>
@@ -274,7 +269,7 @@
       </p:grpSpPr>
       <p:sp>
         <p:nvSpPr>
-          <p:cNvPr id="103" name="PlaceHolder 1"/>
+          <p:cNvPr id="102" name="PlaceHolder 1"/>
           <p:cNvSpPr>
             <a:spLocks noGrp="1"/>
           </p:cNvSpPr>
@@ -285,16 +280,16 @@
         <p:spPr>
           <a:xfrm>
             <a:off x="380880" y="685800"/>
-            <a:ext cx="6095520" cy="3428640"/>
-          </a:xfrm>
-          <a:prstGeom prst="rect">
-            <a:avLst/>
-          </a:prstGeom>
-        </p:spPr>
-      </p:sp>
-      <p:sp>
-        <p:nvSpPr>
-          <p:cNvPr id="104" name="PlaceHolder 2"/>
+            <a:ext cx="6095160" cy="3428280"/>
+          </a:xfrm>
+          <a:prstGeom prst="rect">
+            <a:avLst/>
+          </a:prstGeom>
+        </p:spPr>
+      </p:sp>
+      <p:sp>
+        <p:nvSpPr>
+          <p:cNvPr id="103" name="PlaceHolder 2"/>
           <p:cNvSpPr>
             <a:spLocks noGrp="1"/>
           </p:cNvSpPr>
@@ -305,7 +300,7 @@
         <p:spPr>
           <a:xfrm>
             <a:off x="914400" y="4343400"/>
-            <a:ext cx="5028840" cy="4114440"/>
+            <a:ext cx="5028480" cy="4114080"/>
           </a:xfrm>
           <a:prstGeom prst="rect">
             <a:avLst/>
@@ -322,14 +317,14 @@
       </p:sp>
       <p:sp>
         <p:nvSpPr>
-          <p:cNvPr id="105" name="TextShape 3"/>
-          <p:cNvSpPr txBox="1"/>
+          <p:cNvPr id="104" name="CustomShape 3"/>
+          <p:cNvSpPr/>
           <p:nvPr/>
         </p:nvSpPr>
         <p:spPr>
           <a:xfrm>
             <a:off x="0" y="0"/>
-            <a:ext cx="360000" cy="360000"/>
+            <a:ext cx="359640" cy="359640"/>
           </a:xfrm>
           <a:prstGeom prst="rect">
             <a:avLst/>
@@ -339,6 +334,12 @@
             <a:noFill/>
           </a:ln>
         </p:spPr>
+        <p:style>
+          <a:lnRef idx="0"/>
+          <a:fillRef idx="0"/>
+          <a:effectRef idx="0"/>
+          <a:fontRef idx="minor"/>
+        </p:style>
         <p:txBody>
           <a:bodyPr lIns="90000" rIns="90000" tIns="45000" bIns="45000"/>
           <a:p>
@@ -347,7 +348,7 @@
                 <a:spcPct val="100000"/>
               </a:lnSpc>
             </a:pPr>
-            <a:fld id="{98A089AE-5F2B-49E6-B67A-59F4BA6BB680}" type="slidenum">
+            <a:fld id="{09CB7A51-AAB6-4292-B8B4-6C2BDCB79284}" type="slidenum">
               <a:rPr b="0" lang="en-US" sz="1800" spc="-1" strike="noStrike">
                 <a:solidFill>
                   <a:srgbClr val="000000"/>
@@ -358,7 +359,7 @@
               <a:t>&lt;number&gt;</a:t>
             </a:fld>
             <a:endParaRPr b="0" lang="en-US" sz="1800" spc="-1" strike="noStrike">
-              <a:latin typeface="Times New Roman"/>
+              <a:latin typeface="Arial"/>
             </a:endParaRPr>
           </a:p>
         </p:txBody>
@@ -409,7 +410,7 @@
       </p:grpSpPr>
       <p:sp>
         <p:nvSpPr>
-          <p:cNvPr id="25" name="PlaceHolder 1"/>
+          <p:cNvPr id="24" name="PlaceHolder 1"/>
           <p:cNvSpPr>
             <a:spLocks noGrp="1"/>
           </p:cNvSpPr>
@@ -420,7 +421,7 @@
         <p:spPr>
           <a:xfrm>
             <a:off x="457200" y="205920"/>
-            <a:ext cx="8229240" cy="856800"/>
+            <a:ext cx="8228880" cy="856440"/>
           </a:xfrm>
           <a:prstGeom prst="rect">
             <a:avLst/>
@@ -429,18 +430,16 @@
         <p:txBody>
           <a:bodyPr lIns="0" rIns="0" tIns="0" bIns="0" anchor="ctr"/>
           <a:p>
-            <a:endParaRPr b="0" lang="en-US" sz="1800" spc="-1" strike="noStrike">
-              <a:solidFill>
-                <a:srgbClr val="000000"/>
-              </a:solidFill>
-              <a:latin typeface="Calibri"/>
-            </a:endParaRPr>
-          </a:p>
-        </p:txBody>
-      </p:sp>
-      <p:sp>
-        <p:nvSpPr>
-          <p:cNvPr id="26" name="PlaceHolder 2"/>
+            <a:pPr algn="ctr"/>
+            <a:endParaRPr b="0" lang="en-US" sz="4400" spc="-1" strike="noStrike">
+              <a:latin typeface="Arial"/>
+            </a:endParaRPr>
+          </a:p>
+        </p:txBody>
+      </p:sp>
+      <p:sp>
+        <p:nvSpPr>
+          <p:cNvPr id="25" name="PlaceHolder 2"/>
           <p:cNvSpPr>
             <a:spLocks noGrp="1"/>
           </p:cNvSpPr>
@@ -451,7 +450,7 @@
         <p:spPr>
           <a:xfrm>
             <a:off x="457200" y="1200240"/>
-            <a:ext cx="8229240" cy="1618920"/>
+            <a:ext cx="8228880" cy="1618560"/>
           </a:xfrm>
           <a:prstGeom prst="rect">
             <a:avLst/>
@@ -463,17 +462,14 @@
           </a:bodyPr>
           <a:p>
             <a:endParaRPr b="0" lang="en-US" sz="3200" spc="-1" strike="noStrike">
-              <a:solidFill>
-                <a:srgbClr val="000000"/>
-              </a:solidFill>
-              <a:latin typeface="Calibri"/>
-            </a:endParaRPr>
-          </a:p>
-        </p:txBody>
-      </p:sp>
-      <p:sp>
-        <p:nvSpPr>
-          <p:cNvPr id="27" name="PlaceHolder 3"/>
+              <a:latin typeface="Arial"/>
+            </a:endParaRPr>
+          </a:p>
+        </p:txBody>
+      </p:sp>
+      <p:sp>
+        <p:nvSpPr>
+          <p:cNvPr id="26" name="PlaceHolder 3"/>
           <p:cNvSpPr>
             <a:spLocks noGrp="1"/>
           </p:cNvSpPr>
@@ -483,8 +479,8 @@
         </p:nvSpPr>
         <p:spPr>
           <a:xfrm>
-            <a:off x="457200" y="2973240"/>
-            <a:ext cx="8229240" cy="1618920"/>
+            <a:off x="457200" y="2972880"/>
+            <a:ext cx="8228880" cy="1618560"/>
           </a:xfrm>
           <a:prstGeom prst="rect">
             <a:avLst/>
@@ -496,10 +492,7 @@
           </a:bodyPr>
           <a:p>
             <a:endParaRPr b="0" lang="en-US" sz="3200" spc="-1" strike="noStrike">
-              <a:solidFill>
-                <a:srgbClr val="000000"/>
-              </a:solidFill>
-              <a:latin typeface="Calibri"/>
+              <a:latin typeface="Arial"/>
             </a:endParaRPr>
           </a:p>
         </p:txBody>
@@ -528,7 +521,7 @@
       </p:grpSpPr>
       <p:sp>
         <p:nvSpPr>
-          <p:cNvPr id="28" name="PlaceHolder 1"/>
+          <p:cNvPr id="27" name="PlaceHolder 1"/>
           <p:cNvSpPr>
             <a:spLocks noGrp="1"/>
           </p:cNvSpPr>
@@ -539,7 +532,7 @@
         <p:spPr>
           <a:xfrm>
             <a:off x="457200" y="205920"/>
-            <a:ext cx="8229240" cy="856800"/>
+            <a:ext cx="8228880" cy="856440"/>
           </a:xfrm>
           <a:prstGeom prst="rect">
             <a:avLst/>
@@ -548,18 +541,16 @@
         <p:txBody>
           <a:bodyPr lIns="0" rIns="0" tIns="0" bIns="0" anchor="ctr"/>
           <a:p>
-            <a:endParaRPr b="0" lang="en-US" sz="1800" spc="-1" strike="noStrike">
-              <a:solidFill>
-                <a:srgbClr val="000000"/>
-              </a:solidFill>
-              <a:latin typeface="Calibri"/>
-            </a:endParaRPr>
-          </a:p>
-        </p:txBody>
-      </p:sp>
-      <p:sp>
-        <p:nvSpPr>
-          <p:cNvPr id="29" name="PlaceHolder 2"/>
+            <a:pPr algn="ctr"/>
+            <a:endParaRPr b="0" lang="en-US" sz="4400" spc="-1" strike="noStrike">
+              <a:latin typeface="Arial"/>
+            </a:endParaRPr>
+          </a:p>
+        </p:txBody>
+      </p:sp>
+      <p:sp>
+        <p:nvSpPr>
+          <p:cNvPr id="28" name="PlaceHolder 2"/>
           <p:cNvSpPr>
             <a:spLocks noGrp="1"/>
           </p:cNvSpPr>
@@ -570,7 +561,7 @@
         <p:spPr>
           <a:xfrm>
             <a:off x="457200" y="1200240"/>
-            <a:ext cx="4015800" cy="1618920"/>
+            <a:ext cx="4015440" cy="1618560"/>
           </a:xfrm>
           <a:prstGeom prst="rect">
             <a:avLst/>
@@ -582,17 +573,14 @@
           </a:bodyPr>
           <a:p>
             <a:endParaRPr b="0" lang="en-US" sz="3200" spc="-1" strike="noStrike">
-              <a:solidFill>
-                <a:srgbClr val="000000"/>
-              </a:solidFill>
-              <a:latin typeface="Calibri"/>
-            </a:endParaRPr>
-          </a:p>
-        </p:txBody>
-      </p:sp>
-      <p:sp>
-        <p:nvSpPr>
-          <p:cNvPr id="30" name="PlaceHolder 3"/>
+              <a:latin typeface="Arial"/>
+            </a:endParaRPr>
+          </a:p>
+        </p:txBody>
+      </p:sp>
+      <p:sp>
+        <p:nvSpPr>
+          <p:cNvPr id="29" name="PlaceHolder 3"/>
           <p:cNvSpPr>
             <a:spLocks noGrp="1"/>
           </p:cNvSpPr>
@@ -602,8 +590,8 @@
         </p:nvSpPr>
         <p:spPr>
           <a:xfrm>
-            <a:off x="4674240" y="1200240"/>
-            <a:ext cx="4015800" cy="1618920"/>
+            <a:off x="4673880" y="1200240"/>
+            <a:ext cx="4015440" cy="1618560"/>
           </a:xfrm>
           <a:prstGeom prst="rect">
             <a:avLst/>
@@ -615,17 +603,14 @@
           </a:bodyPr>
           <a:p>
             <a:endParaRPr b="0" lang="en-US" sz="3200" spc="-1" strike="noStrike">
-              <a:solidFill>
-                <a:srgbClr val="000000"/>
-              </a:solidFill>
-              <a:latin typeface="Calibri"/>
-            </a:endParaRPr>
-          </a:p>
-        </p:txBody>
-      </p:sp>
-      <p:sp>
-        <p:nvSpPr>
-          <p:cNvPr id="31" name="PlaceHolder 4"/>
+              <a:latin typeface="Arial"/>
+            </a:endParaRPr>
+          </a:p>
+        </p:txBody>
+      </p:sp>
+      <p:sp>
+        <p:nvSpPr>
+          <p:cNvPr id="30" name="PlaceHolder 4"/>
           <p:cNvSpPr>
             <a:spLocks noGrp="1"/>
           </p:cNvSpPr>
@@ -635,8 +620,8 @@
         </p:nvSpPr>
         <p:spPr>
           <a:xfrm>
-            <a:off x="457200" y="2973240"/>
-            <a:ext cx="4015800" cy="1618920"/>
+            <a:off x="457200" y="2972880"/>
+            <a:ext cx="4015440" cy="1618560"/>
           </a:xfrm>
           <a:prstGeom prst="rect">
             <a:avLst/>
@@ -648,17 +633,14 @@
           </a:bodyPr>
           <a:p>
             <a:endParaRPr b="0" lang="en-US" sz="3200" spc="-1" strike="noStrike">
-              <a:solidFill>
-                <a:srgbClr val="000000"/>
-              </a:solidFill>
-              <a:latin typeface="Calibri"/>
-            </a:endParaRPr>
-          </a:p>
-        </p:txBody>
-      </p:sp>
-      <p:sp>
-        <p:nvSpPr>
-          <p:cNvPr id="32" name="PlaceHolder 5"/>
+              <a:latin typeface="Arial"/>
+            </a:endParaRPr>
+          </a:p>
+        </p:txBody>
+      </p:sp>
+      <p:sp>
+        <p:nvSpPr>
+          <p:cNvPr id="31" name="PlaceHolder 5"/>
           <p:cNvSpPr>
             <a:spLocks noGrp="1"/>
           </p:cNvSpPr>
@@ -668,8 +650,8 @@
         </p:nvSpPr>
         <p:spPr>
           <a:xfrm>
-            <a:off x="4674240" y="2973240"/>
-            <a:ext cx="4015800" cy="1618920"/>
+            <a:off x="4673880" y="2972880"/>
+            <a:ext cx="4015440" cy="1618560"/>
           </a:xfrm>
           <a:prstGeom prst="rect">
             <a:avLst/>
@@ -681,10 +663,7 @@
           </a:bodyPr>
           <a:p>
             <a:endParaRPr b="0" lang="en-US" sz="3200" spc="-1" strike="noStrike">
-              <a:solidFill>
-                <a:srgbClr val="000000"/>
-              </a:solidFill>
-              <a:latin typeface="Calibri"/>
+              <a:latin typeface="Arial"/>
             </a:endParaRPr>
           </a:p>
         </p:txBody>
@@ -713,7 +692,7 @@
       </p:grpSpPr>
       <p:sp>
         <p:nvSpPr>
-          <p:cNvPr id="33" name="PlaceHolder 1"/>
+          <p:cNvPr id="32" name="PlaceHolder 1"/>
           <p:cNvSpPr>
             <a:spLocks noGrp="1"/>
           </p:cNvSpPr>
@@ -724,7 +703,7 @@
         <p:spPr>
           <a:xfrm>
             <a:off x="457200" y="205920"/>
-            <a:ext cx="8229240" cy="856800"/>
+            <a:ext cx="8228880" cy="856440"/>
           </a:xfrm>
           <a:prstGeom prst="rect">
             <a:avLst/>
@@ -733,18 +712,16 @@
         <p:txBody>
           <a:bodyPr lIns="0" rIns="0" tIns="0" bIns="0" anchor="ctr"/>
           <a:p>
-            <a:endParaRPr b="0" lang="en-US" sz="1800" spc="-1" strike="noStrike">
-              <a:solidFill>
-                <a:srgbClr val="000000"/>
-              </a:solidFill>
-              <a:latin typeface="Calibri"/>
-            </a:endParaRPr>
-          </a:p>
-        </p:txBody>
-      </p:sp>
-      <p:sp>
-        <p:nvSpPr>
-          <p:cNvPr id="34" name="PlaceHolder 2"/>
+            <a:pPr algn="ctr"/>
+            <a:endParaRPr b="0" lang="en-US" sz="4400" spc="-1" strike="noStrike">
+              <a:latin typeface="Arial"/>
+            </a:endParaRPr>
+          </a:p>
+        </p:txBody>
+      </p:sp>
+      <p:sp>
+        <p:nvSpPr>
+          <p:cNvPr id="33" name="PlaceHolder 2"/>
           <p:cNvSpPr>
             <a:spLocks noGrp="1"/>
           </p:cNvSpPr>
@@ -755,7 +732,7 @@
         <p:spPr>
           <a:xfrm>
             <a:off x="457200" y="1200240"/>
-            <a:ext cx="2649600" cy="1618920"/>
+            <a:ext cx="2649600" cy="1618560"/>
           </a:xfrm>
           <a:prstGeom prst="rect">
             <a:avLst/>
@@ -767,17 +744,14 @@
           </a:bodyPr>
           <a:p>
             <a:endParaRPr b="0" lang="en-US" sz="3200" spc="-1" strike="noStrike">
-              <a:solidFill>
-                <a:srgbClr val="000000"/>
-              </a:solidFill>
-              <a:latin typeface="Calibri"/>
-            </a:endParaRPr>
-          </a:p>
-        </p:txBody>
-      </p:sp>
-      <p:sp>
-        <p:nvSpPr>
-          <p:cNvPr id="35" name="PlaceHolder 3"/>
+              <a:latin typeface="Arial"/>
+            </a:endParaRPr>
+          </a:p>
+        </p:txBody>
+      </p:sp>
+      <p:sp>
+        <p:nvSpPr>
+          <p:cNvPr id="34" name="PlaceHolder 3"/>
           <p:cNvSpPr>
             <a:spLocks noGrp="1"/>
           </p:cNvSpPr>
@@ -788,7 +762,7 @@
         <p:spPr>
           <a:xfrm>
             <a:off x="3239640" y="1200240"/>
-            <a:ext cx="2649600" cy="1618920"/>
+            <a:ext cx="2649600" cy="1618560"/>
           </a:xfrm>
           <a:prstGeom prst="rect">
             <a:avLst/>
@@ -800,17 +774,14 @@
           </a:bodyPr>
           <a:p>
             <a:endParaRPr b="0" lang="en-US" sz="3200" spc="-1" strike="noStrike">
-              <a:solidFill>
-                <a:srgbClr val="000000"/>
-              </a:solidFill>
-              <a:latin typeface="Calibri"/>
-            </a:endParaRPr>
-          </a:p>
-        </p:txBody>
-      </p:sp>
-      <p:sp>
-        <p:nvSpPr>
-          <p:cNvPr id="36" name="PlaceHolder 4"/>
+              <a:latin typeface="Arial"/>
+            </a:endParaRPr>
+          </a:p>
+        </p:txBody>
+      </p:sp>
+      <p:sp>
+        <p:nvSpPr>
+          <p:cNvPr id="35" name="PlaceHolder 4"/>
           <p:cNvSpPr>
             <a:spLocks noGrp="1"/>
           </p:cNvSpPr>
@@ -821,7 +792,7 @@
         <p:spPr>
           <a:xfrm>
             <a:off x="6022080" y="1200240"/>
-            <a:ext cx="2649600" cy="1618920"/>
+            <a:ext cx="2649600" cy="1618560"/>
           </a:xfrm>
           <a:prstGeom prst="rect">
             <a:avLst/>
@@ -833,17 +804,14 @@
           </a:bodyPr>
           <a:p>
             <a:endParaRPr b="0" lang="en-US" sz="3200" spc="-1" strike="noStrike">
-              <a:solidFill>
-                <a:srgbClr val="000000"/>
-              </a:solidFill>
-              <a:latin typeface="Calibri"/>
-            </a:endParaRPr>
-          </a:p>
-        </p:txBody>
-      </p:sp>
-      <p:sp>
-        <p:nvSpPr>
-          <p:cNvPr id="37" name="PlaceHolder 5"/>
+              <a:latin typeface="Arial"/>
+            </a:endParaRPr>
+          </a:p>
+        </p:txBody>
+      </p:sp>
+      <p:sp>
+        <p:nvSpPr>
+          <p:cNvPr id="36" name="PlaceHolder 5"/>
           <p:cNvSpPr>
             <a:spLocks noGrp="1"/>
           </p:cNvSpPr>
@@ -853,8 +821,8 @@
         </p:nvSpPr>
         <p:spPr>
           <a:xfrm>
-            <a:off x="457200" y="2973240"/>
-            <a:ext cx="2649600" cy="1618920"/>
+            <a:off x="457200" y="2972880"/>
+            <a:ext cx="2649600" cy="1618560"/>
           </a:xfrm>
           <a:prstGeom prst="rect">
             <a:avLst/>
@@ -866,17 +834,14 @@
           </a:bodyPr>
           <a:p>
             <a:endParaRPr b="0" lang="en-US" sz="3200" spc="-1" strike="noStrike">
-              <a:solidFill>
-                <a:srgbClr val="000000"/>
-              </a:solidFill>
-              <a:latin typeface="Calibri"/>
-            </a:endParaRPr>
-          </a:p>
-        </p:txBody>
-      </p:sp>
-      <p:sp>
-        <p:nvSpPr>
-          <p:cNvPr id="38" name="PlaceHolder 6"/>
+              <a:latin typeface="Arial"/>
+            </a:endParaRPr>
+          </a:p>
+        </p:txBody>
+      </p:sp>
+      <p:sp>
+        <p:nvSpPr>
+          <p:cNvPr id="37" name="PlaceHolder 6"/>
           <p:cNvSpPr>
             <a:spLocks noGrp="1"/>
           </p:cNvSpPr>
@@ -886,8 +851,8 @@
         </p:nvSpPr>
         <p:spPr>
           <a:xfrm>
-            <a:off x="3239640" y="2973240"/>
-            <a:ext cx="2649600" cy="1618920"/>
+            <a:off x="3239640" y="2972880"/>
+            <a:ext cx="2649600" cy="1618560"/>
           </a:xfrm>
           <a:prstGeom prst="rect">
             <a:avLst/>
@@ -899,17 +864,14 @@
           </a:bodyPr>
           <a:p>
             <a:endParaRPr b="0" lang="en-US" sz="3200" spc="-1" strike="noStrike">
-              <a:solidFill>
-                <a:srgbClr val="000000"/>
-              </a:solidFill>
-              <a:latin typeface="Calibri"/>
-            </a:endParaRPr>
-          </a:p>
-        </p:txBody>
-      </p:sp>
-      <p:sp>
-        <p:nvSpPr>
-          <p:cNvPr id="39" name="PlaceHolder 7"/>
+              <a:latin typeface="Arial"/>
+            </a:endParaRPr>
+          </a:p>
+        </p:txBody>
+      </p:sp>
+      <p:sp>
+        <p:nvSpPr>
+          <p:cNvPr id="38" name="PlaceHolder 7"/>
           <p:cNvSpPr>
             <a:spLocks noGrp="1"/>
           </p:cNvSpPr>
@@ -919,8 +881,8 @@
         </p:nvSpPr>
         <p:spPr>
           <a:xfrm>
-            <a:off x="6022080" y="2973240"/>
-            <a:ext cx="2649600" cy="1618920"/>
+            <a:off x="6022080" y="2972880"/>
+            <a:ext cx="2649600" cy="1618560"/>
           </a:xfrm>
           <a:prstGeom prst="rect">
             <a:avLst/>
@@ -932,10 +894,7 @@
           </a:bodyPr>
           <a:p>
             <a:endParaRPr b="0" lang="en-US" sz="3200" spc="-1" strike="noStrike">
-              <a:solidFill>
-                <a:srgbClr val="000000"/>
-              </a:solidFill>
-              <a:latin typeface="Calibri"/>
+              <a:latin typeface="Arial"/>
             </a:endParaRPr>
           </a:p>
         </p:txBody>
@@ -986,7 +945,7 @@
       </p:grpSpPr>
       <p:sp>
         <p:nvSpPr>
-          <p:cNvPr id="44" name="PlaceHolder 1"/>
+          <p:cNvPr id="42" name="PlaceHolder 1"/>
           <p:cNvSpPr>
             <a:spLocks noGrp="1"/>
           </p:cNvSpPr>
@@ -997,7 +956,7 @@
         <p:spPr>
           <a:xfrm>
             <a:off x="457200" y="205920"/>
-            <a:ext cx="8229240" cy="856800"/>
+            <a:ext cx="8228880" cy="856440"/>
           </a:xfrm>
           <a:prstGeom prst="rect">
             <a:avLst/>
@@ -1006,18 +965,16 @@
         <p:txBody>
           <a:bodyPr lIns="0" rIns="0" tIns="0" bIns="0" anchor="ctr"/>
           <a:p>
-            <a:endParaRPr b="0" lang="en-US" sz="1800" spc="-1" strike="noStrike">
-              <a:solidFill>
-                <a:srgbClr val="000000"/>
-              </a:solidFill>
-              <a:latin typeface="Calibri"/>
-            </a:endParaRPr>
-          </a:p>
-        </p:txBody>
-      </p:sp>
-      <p:sp>
-        <p:nvSpPr>
-          <p:cNvPr id="45" name="PlaceHolder 2"/>
+            <a:pPr algn="ctr"/>
+            <a:endParaRPr b="0" lang="en-US" sz="4400" spc="-1" strike="noStrike">
+              <a:latin typeface="Arial"/>
+            </a:endParaRPr>
+          </a:p>
+        </p:txBody>
+      </p:sp>
+      <p:sp>
+        <p:nvSpPr>
+          <p:cNvPr id="43" name="PlaceHolder 2"/>
           <p:cNvSpPr>
             <a:spLocks noGrp="1"/>
           </p:cNvSpPr>
@@ -1028,7 +985,7 @@
         <p:spPr>
           <a:xfrm>
             <a:off x="457200" y="1200240"/>
-            <a:ext cx="8229240" cy="3394080"/>
+            <a:ext cx="8228880" cy="3393720"/>
           </a:xfrm>
           <a:prstGeom prst="rect">
             <a:avLst/>
@@ -1068,7 +1025,7 @@
       </p:grpSpPr>
       <p:sp>
         <p:nvSpPr>
-          <p:cNvPr id="46" name="PlaceHolder 1"/>
+          <p:cNvPr id="44" name="PlaceHolder 1"/>
           <p:cNvSpPr>
             <a:spLocks noGrp="1"/>
           </p:cNvSpPr>
@@ -1079,7 +1036,7 @@
         <p:spPr>
           <a:xfrm>
             <a:off x="457200" y="205920"/>
-            <a:ext cx="8229240" cy="856800"/>
+            <a:ext cx="8228880" cy="856440"/>
           </a:xfrm>
           <a:prstGeom prst="rect">
             <a:avLst/>
@@ -1088,18 +1045,16 @@
         <p:txBody>
           <a:bodyPr lIns="0" rIns="0" tIns="0" bIns="0" anchor="ctr"/>
           <a:p>
-            <a:endParaRPr b="0" lang="en-US" sz="1800" spc="-1" strike="noStrike">
-              <a:solidFill>
-                <a:srgbClr val="000000"/>
-              </a:solidFill>
-              <a:latin typeface="Calibri"/>
-            </a:endParaRPr>
-          </a:p>
-        </p:txBody>
-      </p:sp>
-      <p:sp>
-        <p:nvSpPr>
-          <p:cNvPr id="47" name="PlaceHolder 2"/>
+            <a:pPr algn="ctr"/>
+            <a:endParaRPr b="0" lang="en-US" sz="4400" spc="-1" strike="noStrike">
+              <a:latin typeface="Arial"/>
+            </a:endParaRPr>
+          </a:p>
+        </p:txBody>
+      </p:sp>
+      <p:sp>
+        <p:nvSpPr>
+          <p:cNvPr id="45" name="PlaceHolder 2"/>
           <p:cNvSpPr>
             <a:spLocks noGrp="1"/>
           </p:cNvSpPr>
@@ -1110,7 +1065,7 @@
         <p:spPr>
           <a:xfrm>
             <a:off x="457200" y="1200240"/>
-            <a:ext cx="8229240" cy="3394080"/>
+            <a:ext cx="8228880" cy="3393720"/>
           </a:xfrm>
           <a:prstGeom prst="rect">
             <a:avLst/>
@@ -1122,10 +1077,7 @@
           </a:bodyPr>
           <a:p>
             <a:endParaRPr b="0" lang="en-US" sz="3200" spc="-1" strike="noStrike">
-              <a:solidFill>
-                <a:srgbClr val="000000"/>
-              </a:solidFill>
-              <a:latin typeface="Calibri"/>
+              <a:latin typeface="Arial"/>
             </a:endParaRPr>
           </a:p>
         </p:txBody>
@@ -1154,7 +1106,7 @@
       </p:grpSpPr>
       <p:sp>
         <p:nvSpPr>
-          <p:cNvPr id="48" name="PlaceHolder 1"/>
+          <p:cNvPr id="46" name="PlaceHolder 1"/>
           <p:cNvSpPr>
             <a:spLocks noGrp="1"/>
           </p:cNvSpPr>
@@ -1165,7 +1117,7 @@
         <p:spPr>
           <a:xfrm>
             <a:off x="457200" y="205920"/>
-            <a:ext cx="8229240" cy="856800"/>
+            <a:ext cx="8228880" cy="856440"/>
           </a:xfrm>
           <a:prstGeom prst="rect">
             <a:avLst/>
@@ -1174,18 +1126,16 @@
         <p:txBody>
           <a:bodyPr lIns="0" rIns="0" tIns="0" bIns="0" anchor="ctr"/>
           <a:p>
-            <a:endParaRPr b="0" lang="en-US" sz="1800" spc="-1" strike="noStrike">
-              <a:solidFill>
-                <a:srgbClr val="000000"/>
-              </a:solidFill>
-              <a:latin typeface="Calibri"/>
-            </a:endParaRPr>
-          </a:p>
-        </p:txBody>
-      </p:sp>
-      <p:sp>
-        <p:nvSpPr>
-          <p:cNvPr id="49" name="PlaceHolder 2"/>
+            <a:pPr algn="ctr"/>
+            <a:endParaRPr b="0" lang="en-US" sz="4400" spc="-1" strike="noStrike">
+              <a:latin typeface="Arial"/>
+            </a:endParaRPr>
+          </a:p>
+        </p:txBody>
+      </p:sp>
+      <p:sp>
+        <p:nvSpPr>
+          <p:cNvPr id="47" name="PlaceHolder 2"/>
           <p:cNvSpPr>
             <a:spLocks noGrp="1"/>
           </p:cNvSpPr>
@@ -1196,7 +1146,7 @@
         <p:spPr>
           <a:xfrm>
             <a:off x="457200" y="1200240"/>
-            <a:ext cx="4015800" cy="3394080"/>
+            <a:ext cx="4015440" cy="3393720"/>
           </a:xfrm>
           <a:prstGeom prst="rect">
             <a:avLst/>
@@ -1208,17 +1158,14 @@
           </a:bodyPr>
           <a:p>
             <a:endParaRPr b="0" lang="en-US" sz="3200" spc="-1" strike="noStrike">
-              <a:solidFill>
-                <a:srgbClr val="000000"/>
-              </a:solidFill>
-              <a:latin typeface="Calibri"/>
-            </a:endParaRPr>
-          </a:p>
-        </p:txBody>
-      </p:sp>
-      <p:sp>
-        <p:nvSpPr>
-          <p:cNvPr id="50" name="PlaceHolder 3"/>
+              <a:latin typeface="Arial"/>
+            </a:endParaRPr>
+          </a:p>
+        </p:txBody>
+      </p:sp>
+      <p:sp>
+        <p:nvSpPr>
+          <p:cNvPr id="48" name="PlaceHolder 3"/>
           <p:cNvSpPr>
             <a:spLocks noGrp="1"/>
           </p:cNvSpPr>
@@ -1228,8 +1175,8 @@
         </p:nvSpPr>
         <p:spPr>
           <a:xfrm>
-            <a:off x="4674240" y="1200240"/>
-            <a:ext cx="4015800" cy="3394080"/>
+            <a:off x="4673880" y="1200240"/>
+            <a:ext cx="4015440" cy="3393720"/>
           </a:xfrm>
           <a:prstGeom prst="rect">
             <a:avLst/>
@@ -1241,10 +1188,7 @@
           </a:bodyPr>
           <a:p>
             <a:endParaRPr b="0" lang="en-US" sz="3200" spc="-1" strike="noStrike">
-              <a:solidFill>
-                <a:srgbClr val="000000"/>
-              </a:solidFill>
-              <a:latin typeface="Calibri"/>
+              <a:latin typeface="Arial"/>
             </a:endParaRPr>
           </a:p>
         </p:txBody>
@@ -1273,7 +1217,7 @@
       </p:grpSpPr>
       <p:sp>
         <p:nvSpPr>
-          <p:cNvPr id="51" name="PlaceHolder 1"/>
+          <p:cNvPr id="49" name="PlaceHolder 1"/>
           <p:cNvSpPr>
             <a:spLocks noGrp="1"/>
           </p:cNvSpPr>
@@ -1284,7 +1228,7 @@
         <p:spPr>
           <a:xfrm>
             <a:off x="457200" y="205920"/>
-            <a:ext cx="8229240" cy="856800"/>
+            <a:ext cx="8228880" cy="856440"/>
           </a:xfrm>
           <a:prstGeom prst="rect">
             <a:avLst/>
@@ -1293,11 +1237,9 @@
         <p:txBody>
           <a:bodyPr lIns="0" rIns="0" tIns="0" bIns="0" anchor="ctr"/>
           <a:p>
-            <a:endParaRPr b="0" lang="en-US" sz="1800" spc="-1" strike="noStrike">
-              <a:solidFill>
-                <a:srgbClr val="000000"/>
-              </a:solidFill>
-              <a:latin typeface="Calibri"/>
+            <a:pPr algn="ctr"/>
+            <a:endParaRPr b="0" lang="en-US" sz="4400" spc="-1" strike="noStrike">
+              <a:latin typeface="Arial"/>
             </a:endParaRPr>
           </a:p>
         </p:txBody>
@@ -1326,7 +1268,7 @@
       </p:grpSpPr>
       <p:sp>
         <p:nvSpPr>
-          <p:cNvPr id="52" name="PlaceHolder 1"/>
+          <p:cNvPr id="50" name="PlaceHolder 1"/>
           <p:cNvSpPr>
             <a:spLocks noGrp="1"/>
           </p:cNvSpPr>
@@ -1337,7 +1279,7 @@
         <p:spPr>
           <a:xfrm>
             <a:off x="457200" y="205920"/>
-            <a:ext cx="8229240" cy="3972960"/>
+            <a:ext cx="8228880" cy="3971160"/>
           </a:xfrm>
           <a:prstGeom prst="rect">
             <a:avLst/>
@@ -1377,7 +1319,7 @@
       </p:grpSpPr>
       <p:sp>
         <p:nvSpPr>
-          <p:cNvPr id="53" name="PlaceHolder 1"/>
+          <p:cNvPr id="51" name="PlaceHolder 1"/>
           <p:cNvSpPr>
             <a:spLocks noGrp="1"/>
           </p:cNvSpPr>
@@ -1388,7 +1330,7 @@
         <p:spPr>
           <a:xfrm>
             <a:off x="457200" y="205920"/>
-            <a:ext cx="8229240" cy="856800"/>
+            <a:ext cx="8228880" cy="856440"/>
           </a:xfrm>
           <a:prstGeom prst="rect">
             <a:avLst/>
@@ -1397,18 +1339,16 @@
         <p:txBody>
           <a:bodyPr lIns="0" rIns="0" tIns="0" bIns="0" anchor="ctr"/>
           <a:p>
-            <a:endParaRPr b="0" lang="en-US" sz="1800" spc="-1" strike="noStrike">
-              <a:solidFill>
-                <a:srgbClr val="000000"/>
-              </a:solidFill>
-              <a:latin typeface="Calibri"/>
-            </a:endParaRPr>
-          </a:p>
-        </p:txBody>
-      </p:sp>
-      <p:sp>
-        <p:nvSpPr>
-          <p:cNvPr id="54" name="PlaceHolder 2"/>
+            <a:pPr algn="ctr"/>
+            <a:endParaRPr b="0" lang="en-US" sz="4400" spc="-1" strike="noStrike">
+              <a:latin typeface="Arial"/>
+            </a:endParaRPr>
+          </a:p>
+        </p:txBody>
+      </p:sp>
+      <p:sp>
+        <p:nvSpPr>
+          <p:cNvPr id="52" name="PlaceHolder 2"/>
           <p:cNvSpPr>
             <a:spLocks noGrp="1"/>
           </p:cNvSpPr>
@@ -1419,7 +1359,7 @@
         <p:spPr>
           <a:xfrm>
             <a:off x="457200" y="1200240"/>
-            <a:ext cx="4015800" cy="1618920"/>
+            <a:ext cx="4015440" cy="1618560"/>
           </a:xfrm>
           <a:prstGeom prst="rect">
             <a:avLst/>
@@ -1431,17 +1371,14 @@
           </a:bodyPr>
           <a:p>
             <a:endParaRPr b="0" lang="en-US" sz="3200" spc="-1" strike="noStrike">
-              <a:solidFill>
-                <a:srgbClr val="000000"/>
-              </a:solidFill>
-              <a:latin typeface="Calibri"/>
-            </a:endParaRPr>
-          </a:p>
-        </p:txBody>
-      </p:sp>
-      <p:sp>
-        <p:nvSpPr>
-          <p:cNvPr id="55" name="PlaceHolder 3"/>
+              <a:latin typeface="Arial"/>
+            </a:endParaRPr>
+          </a:p>
+        </p:txBody>
+      </p:sp>
+      <p:sp>
+        <p:nvSpPr>
+          <p:cNvPr id="53" name="PlaceHolder 3"/>
           <p:cNvSpPr>
             <a:spLocks noGrp="1"/>
           </p:cNvSpPr>
@@ -1451,8 +1388,8 @@
         </p:nvSpPr>
         <p:spPr>
           <a:xfrm>
-            <a:off x="4674240" y="1200240"/>
-            <a:ext cx="4015800" cy="3394080"/>
+            <a:off x="4673880" y="1200240"/>
+            <a:ext cx="4015440" cy="3393720"/>
           </a:xfrm>
           <a:prstGeom prst="rect">
             <a:avLst/>
@@ -1464,17 +1401,14 @@
           </a:bodyPr>
           <a:p>
             <a:endParaRPr b="0" lang="en-US" sz="3200" spc="-1" strike="noStrike">
-              <a:solidFill>
-                <a:srgbClr val="000000"/>
-              </a:solidFill>
-              <a:latin typeface="Calibri"/>
-            </a:endParaRPr>
-          </a:p>
-        </p:txBody>
-      </p:sp>
-      <p:sp>
-        <p:nvSpPr>
-          <p:cNvPr id="56" name="PlaceHolder 4"/>
+              <a:latin typeface="Arial"/>
+            </a:endParaRPr>
+          </a:p>
+        </p:txBody>
+      </p:sp>
+      <p:sp>
+        <p:nvSpPr>
+          <p:cNvPr id="54" name="PlaceHolder 4"/>
           <p:cNvSpPr>
             <a:spLocks noGrp="1"/>
           </p:cNvSpPr>
@@ -1484,8 +1418,8 @@
         </p:nvSpPr>
         <p:spPr>
           <a:xfrm>
-            <a:off x="457200" y="2973240"/>
-            <a:ext cx="4015800" cy="1618920"/>
+            <a:off x="457200" y="2972880"/>
+            <a:ext cx="4015440" cy="1618560"/>
           </a:xfrm>
           <a:prstGeom prst="rect">
             <a:avLst/>
@@ -1497,10 +1431,7 @@
           </a:bodyPr>
           <a:p>
             <a:endParaRPr b="0" lang="en-US" sz="3200" spc="-1" strike="noStrike">
-              <a:solidFill>
-                <a:srgbClr val="000000"/>
-              </a:solidFill>
-              <a:latin typeface="Calibri"/>
+              <a:latin typeface="Arial"/>
             </a:endParaRPr>
           </a:p>
         </p:txBody>
@@ -1529,7 +1460,7 @@
       </p:grpSpPr>
       <p:sp>
         <p:nvSpPr>
-          <p:cNvPr id="4" name="PlaceHolder 1"/>
+          <p:cNvPr id="3" name="PlaceHolder 1"/>
           <p:cNvSpPr>
             <a:spLocks noGrp="1"/>
           </p:cNvSpPr>
@@ -1540,7 +1471,7 @@
         <p:spPr>
           <a:xfrm>
             <a:off x="457200" y="205920"/>
-            <a:ext cx="8229240" cy="856800"/>
+            <a:ext cx="8228880" cy="856440"/>
           </a:xfrm>
           <a:prstGeom prst="rect">
             <a:avLst/>
@@ -1549,18 +1480,16 @@
         <p:txBody>
           <a:bodyPr lIns="0" rIns="0" tIns="0" bIns="0" anchor="ctr"/>
           <a:p>
-            <a:endParaRPr b="0" lang="en-US" sz="1800" spc="-1" strike="noStrike">
-              <a:solidFill>
-                <a:srgbClr val="000000"/>
-              </a:solidFill>
-              <a:latin typeface="Calibri"/>
-            </a:endParaRPr>
-          </a:p>
-        </p:txBody>
-      </p:sp>
-      <p:sp>
-        <p:nvSpPr>
-          <p:cNvPr id="5" name="PlaceHolder 2"/>
+            <a:pPr algn="ctr"/>
+            <a:endParaRPr b="0" lang="en-US" sz="4400" spc="-1" strike="noStrike">
+              <a:latin typeface="Arial"/>
+            </a:endParaRPr>
+          </a:p>
+        </p:txBody>
+      </p:sp>
+      <p:sp>
+        <p:nvSpPr>
+          <p:cNvPr id="4" name="PlaceHolder 2"/>
           <p:cNvSpPr>
             <a:spLocks noGrp="1"/>
           </p:cNvSpPr>
@@ -1571,7 +1500,7 @@
         <p:spPr>
           <a:xfrm>
             <a:off x="457200" y="1200240"/>
-            <a:ext cx="8229240" cy="3394080"/>
+            <a:ext cx="8228880" cy="3393720"/>
           </a:xfrm>
           <a:prstGeom prst="rect">
             <a:avLst/>
@@ -1611,7 +1540,7 @@
       </p:grpSpPr>
       <p:sp>
         <p:nvSpPr>
-          <p:cNvPr id="57" name="PlaceHolder 1"/>
+          <p:cNvPr id="55" name="PlaceHolder 1"/>
           <p:cNvSpPr>
             <a:spLocks noGrp="1"/>
           </p:cNvSpPr>
@@ -1622,7 +1551,7 @@
         <p:spPr>
           <a:xfrm>
             <a:off x="457200" y="205920"/>
-            <a:ext cx="8229240" cy="856800"/>
+            <a:ext cx="8228880" cy="856440"/>
           </a:xfrm>
           <a:prstGeom prst="rect">
             <a:avLst/>
@@ -1631,18 +1560,16 @@
         <p:txBody>
           <a:bodyPr lIns="0" rIns="0" tIns="0" bIns="0" anchor="ctr"/>
           <a:p>
-            <a:endParaRPr b="0" lang="en-US" sz="1800" spc="-1" strike="noStrike">
-              <a:solidFill>
-                <a:srgbClr val="000000"/>
-              </a:solidFill>
-              <a:latin typeface="Calibri"/>
-            </a:endParaRPr>
-          </a:p>
-        </p:txBody>
-      </p:sp>
-      <p:sp>
-        <p:nvSpPr>
-          <p:cNvPr id="58" name="PlaceHolder 2"/>
+            <a:pPr algn="ctr"/>
+            <a:endParaRPr b="0" lang="en-US" sz="4400" spc="-1" strike="noStrike">
+              <a:latin typeface="Arial"/>
+            </a:endParaRPr>
+          </a:p>
+        </p:txBody>
+      </p:sp>
+      <p:sp>
+        <p:nvSpPr>
+          <p:cNvPr id="56" name="PlaceHolder 2"/>
           <p:cNvSpPr>
             <a:spLocks noGrp="1"/>
           </p:cNvSpPr>
@@ -1653,7 +1580,7 @@
         <p:spPr>
           <a:xfrm>
             <a:off x="457200" y="1200240"/>
-            <a:ext cx="4015800" cy="3394080"/>
+            <a:ext cx="4015440" cy="3393720"/>
           </a:xfrm>
           <a:prstGeom prst="rect">
             <a:avLst/>
@@ -1665,17 +1592,14 @@
           </a:bodyPr>
           <a:p>
             <a:endParaRPr b="0" lang="en-US" sz="3200" spc="-1" strike="noStrike">
-              <a:solidFill>
-                <a:srgbClr val="000000"/>
-              </a:solidFill>
-              <a:latin typeface="Calibri"/>
-            </a:endParaRPr>
-          </a:p>
-        </p:txBody>
-      </p:sp>
-      <p:sp>
-        <p:nvSpPr>
-          <p:cNvPr id="59" name="PlaceHolder 3"/>
+              <a:latin typeface="Arial"/>
+            </a:endParaRPr>
+          </a:p>
+        </p:txBody>
+      </p:sp>
+      <p:sp>
+        <p:nvSpPr>
+          <p:cNvPr id="57" name="PlaceHolder 3"/>
           <p:cNvSpPr>
             <a:spLocks noGrp="1"/>
           </p:cNvSpPr>
@@ -1685,8 +1609,8 @@
         </p:nvSpPr>
         <p:spPr>
           <a:xfrm>
-            <a:off x="4674240" y="1200240"/>
-            <a:ext cx="4015800" cy="1618920"/>
+            <a:off x="4673880" y="1200240"/>
+            <a:ext cx="4015440" cy="1618560"/>
           </a:xfrm>
           <a:prstGeom prst="rect">
             <a:avLst/>
@@ -1698,17 +1622,14 @@
           </a:bodyPr>
           <a:p>
             <a:endParaRPr b="0" lang="en-US" sz="3200" spc="-1" strike="noStrike">
-              <a:solidFill>
-                <a:srgbClr val="000000"/>
-              </a:solidFill>
-              <a:latin typeface="Calibri"/>
-            </a:endParaRPr>
-          </a:p>
-        </p:txBody>
-      </p:sp>
-      <p:sp>
-        <p:nvSpPr>
-          <p:cNvPr id="60" name="PlaceHolder 4"/>
+              <a:latin typeface="Arial"/>
+            </a:endParaRPr>
+          </a:p>
+        </p:txBody>
+      </p:sp>
+      <p:sp>
+        <p:nvSpPr>
+          <p:cNvPr id="58" name="PlaceHolder 4"/>
           <p:cNvSpPr>
             <a:spLocks noGrp="1"/>
           </p:cNvSpPr>
@@ -1718,8 +1639,8 @@
         </p:nvSpPr>
         <p:spPr>
           <a:xfrm>
-            <a:off x="4674240" y="2973240"/>
-            <a:ext cx="4015800" cy="1618920"/>
+            <a:off x="4673880" y="2972880"/>
+            <a:ext cx="4015440" cy="1618560"/>
           </a:xfrm>
           <a:prstGeom prst="rect">
             <a:avLst/>
@@ -1731,10 +1652,7 @@
           </a:bodyPr>
           <a:p>
             <a:endParaRPr b="0" lang="en-US" sz="3200" spc="-1" strike="noStrike">
-              <a:solidFill>
-                <a:srgbClr val="000000"/>
-              </a:solidFill>
-              <a:latin typeface="Calibri"/>
+              <a:latin typeface="Arial"/>
             </a:endParaRPr>
           </a:p>
         </p:txBody>
@@ -1763,7 +1681,7 @@
       </p:grpSpPr>
       <p:sp>
         <p:nvSpPr>
-          <p:cNvPr id="61" name="PlaceHolder 1"/>
+          <p:cNvPr id="59" name="PlaceHolder 1"/>
           <p:cNvSpPr>
             <a:spLocks noGrp="1"/>
           </p:cNvSpPr>
@@ -1774,7 +1692,7 @@
         <p:spPr>
           <a:xfrm>
             <a:off x="457200" y="205920"/>
-            <a:ext cx="8229240" cy="856800"/>
+            <a:ext cx="8228880" cy="856440"/>
           </a:xfrm>
           <a:prstGeom prst="rect">
             <a:avLst/>
@@ -1783,18 +1701,16 @@
         <p:txBody>
           <a:bodyPr lIns="0" rIns="0" tIns="0" bIns="0" anchor="ctr"/>
           <a:p>
-            <a:endParaRPr b="0" lang="en-US" sz="1800" spc="-1" strike="noStrike">
-              <a:solidFill>
-                <a:srgbClr val="000000"/>
-              </a:solidFill>
-              <a:latin typeface="Calibri"/>
-            </a:endParaRPr>
-          </a:p>
-        </p:txBody>
-      </p:sp>
-      <p:sp>
-        <p:nvSpPr>
-          <p:cNvPr id="62" name="PlaceHolder 2"/>
+            <a:pPr algn="ctr"/>
+            <a:endParaRPr b="0" lang="en-US" sz="4400" spc="-1" strike="noStrike">
+              <a:latin typeface="Arial"/>
+            </a:endParaRPr>
+          </a:p>
+        </p:txBody>
+      </p:sp>
+      <p:sp>
+        <p:nvSpPr>
+          <p:cNvPr id="60" name="PlaceHolder 2"/>
           <p:cNvSpPr>
             <a:spLocks noGrp="1"/>
           </p:cNvSpPr>
@@ -1805,7 +1721,7 @@
         <p:spPr>
           <a:xfrm>
             <a:off x="457200" y="1200240"/>
-            <a:ext cx="4015800" cy="1618920"/>
+            <a:ext cx="4015440" cy="1618560"/>
           </a:xfrm>
           <a:prstGeom prst="rect">
             <a:avLst/>
@@ -1817,17 +1733,14 @@
           </a:bodyPr>
           <a:p>
             <a:endParaRPr b="0" lang="en-US" sz="3200" spc="-1" strike="noStrike">
-              <a:solidFill>
-                <a:srgbClr val="000000"/>
-              </a:solidFill>
-              <a:latin typeface="Calibri"/>
-            </a:endParaRPr>
-          </a:p>
-        </p:txBody>
-      </p:sp>
-      <p:sp>
-        <p:nvSpPr>
-          <p:cNvPr id="63" name="PlaceHolder 3"/>
+              <a:latin typeface="Arial"/>
+            </a:endParaRPr>
+          </a:p>
+        </p:txBody>
+      </p:sp>
+      <p:sp>
+        <p:nvSpPr>
+          <p:cNvPr id="61" name="PlaceHolder 3"/>
           <p:cNvSpPr>
             <a:spLocks noGrp="1"/>
           </p:cNvSpPr>
@@ -1837,8 +1750,8 @@
         </p:nvSpPr>
         <p:spPr>
           <a:xfrm>
-            <a:off x="4674240" y="1200240"/>
-            <a:ext cx="4015800" cy="1618920"/>
+            <a:off x="4673880" y="1200240"/>
+            <a:ext cx="4015440" cy="1618560"/>
           </a:xfrm>
           <a:prstGeom prst="rect">
             <a:avLst/>
@@ -1850,17 +1763,14 @@
           </a:bodyPr>
           <a:p>
             <a:endParaRPr b="0" lang="en-US" sz="3200" spc="-1" strike="noStrike">
-              <a:solidFill>
-                <a:srgbClr val="000000"/>
-              </a:solidFill>
-              <a:latin typeface="Calibri"/>
-            </a:endParaRPr>
-          </a:p>
-        </p:txBody>
-      </p:sp>
-      <p:sp>
-        <p:nvSpPr>
-          <p:cNvPr id="64" name="PlaceHolder 4"/>
+              <a:latin typeface="Arial"/>
+            </a:endParaRPr>
+          </a:p>
+        </p:txBody>
+      </p:sp>
+      <p:sp>
+        <p:nvSpPr>
+          <p:cNvPr id="62" name="PlaceHolder 4"/>
           <p:cNvSpPr>
             <a:spLocks noGrp="1"/>
           </p:cNvSpPr>
@@ -1870,8 +1780,8 @@
         </p:nvSpPr>
         <p:spPr>
           <a:xfrm>
-            <a:off x="457200" y="2973240"/>
-            <a:ext cx="8229240" cy="1618920"/>
+            <a:off x="457200" y="2972880"/>
+            <a:ext cx="8228880" cy="1618560"/>
           </a:xfrm>
           <a:prstGeom prst="rect">
             <a:avLst/>
@@ -1883,10 +1793,7 @@
           </a:bodyPr>
           <a:p>
             <a:endParaRPr b="0" lang="en-US" sz="3200" spc="-1" strike="noStrike">
-              <a:solidFill>
-                <a:srgbClr val="000000"/>
-              </a:solidFill>
-              <a:latin typeface="Calibri"/>
+              <a:latin typeface="Arial"/>
             </a:endParaRPr>
           </a:p>
         </p:txBody>
@@ -1915,7 +1822,7 @@
       </p:grpSpPr>
       <p:sp>
         <p:nvSpPr>
-          <p:cNvPr id="65" name="PlaceHolder 1"/>
+          <p:cNvPr id="63" name="PlaceHolder 1"/>
           <p:cNvSpPr>
             <a:spLocks noGrp="1"/>
           </p:cNvSpPr>
@@ -1926,7 +1833,7 @@
         <p:spPr>
           <a:xfrm>
             <a:off x="457200" y="205920"/>
-            <a:ext cx="8229240" cy="856800"/>
+            <a:ext cx="8228880" cy="856440"/>
           </a:xfrm>
           <a:prstGeom prst="rect">
             <a:avLst/>
@@ -1935,18 +1842,16 @@
         <p:txBody>
           <a:bodyPr lIns="0" rIns="0" tIns="0" bIns="0" anchor="ctr"/>
           <a:p>
-            <a:endParaRPr b="0" lang="en-US" sz="1800" spc="-1" strike="noStrike">
-              <a:solidFill>
-                <a:srgbClr val="000000"/>
-              </a:solidFill>
-              <a:latin typeface="Calibri"/>
-            </a:endParaRPr>
-          </a:p>
-        </p:txBody>
-      </p:sp>
-      <p:sp>
-        <p:nvSpPr>
-          <p:cNvPr id="66" name="PlaceHolder 2"/>
+            <a:pPr algn="ctr"/>
+            <a:endParaRPr b="0" lang="en-US" sz="4400" spc="-1" strike="noStrike">
+              <a:latin typeface="Arial"/>
+            </a:endParaRPr>
+          </a:p>
+        </p:txBody>
+      </p:sp>
+      <p:sp>
+        <p:nvSpPr>
+          <p:cNvPr id="64" name="PlaceHolder 2"/>
           <p:cNvSpPr>
             <a:spLocks noGrp="1"/>
           </p:cNvSpPr>
@@ -1957,7 +1862,7 @@
         <p:spPr>
           <a:xfrm>
             <a:off x="457200" y="1200240"/>
-            <a:ext cx="8229240" cy="1618920"/>
+            <a:ext cx="8228880" cy="1618560"/>
           </a:xfrm>
           <a:prstGeom prst="rect">
             <a:avLst/>
@@ -1969,17 +1874,14 @@
           </a:bodyPr>
           <a:p>
             <a:endParaRPr b="0" lang="en-US" sz="3200" spc="-1" strike="noStrike">
-              <a:solidFill>
-                <a:srgbClr val="000000"/>
-              </a:solidFill>
-              <a:latin typeface="Calibri"/>
-            </a:endParaRPr>
-          </a:p>
-        </p:txBody>
-      </p:sp>
-      <p:sp>
-        <p:nvSpPr>
-          <p:cNvPr id="67" name="PlaceHolder 3"/>
+              <a:latin typeface="Arial"/>
+            </a:endParaRPr>
+          </a:p>
+        </p:txBody>
+      </p:sp>
+      <p:sp>
+        <p:nvSpPr>
+          <p:cNvPr id="65" name="PlaceHolder 3"/>
           <p:cNvSpPr>
             <a:spLocks noGrp="1"/>
           </p:cNvSpPr>
@@ -1989,8 +1891,8 @@
         </p:nvSpPr>
         <p:spPr>
           <a:xfrm>
-            <a:off x="457200" y="2973240"/>
-            <a:ext cx="8229240" cy="1618920"/>
+            <a:off x="457200" y="2972880"/>
+            <a:ext cx="8228880" cy="1618560"/>
           </a:xfrm>
           <a:prstGeom prst="rect">
             <a:avLst/>
@@ -2002,10 +1904,7 @@
           </a:bodyPr>
           <a:p>
             <a:endParaRPr b="0" lang="en-US" sz="3200" spc="-1" strike="noStrike">
-              <a:solidFill>
-                <a:srgbClr val="000000"/>
-              </a:solidFill>
-              <a:latin typeface="Calibri"/>
+              <a:latin typeface="Arial"/>
             </a:endParaRPr>
           </a:p>
         </p:txBody>
@@ -2034,7 +1933,7 @@
       </p:grpSpPr>
       <p:sp>
         <p:nvSpPr>
-          <p:cNvPr id="68" name="PlaceHolder 1"/>
+          <p:cNvPr id="66" name="PlaceHolder 1"/>
           <p:cNvSpPr>
             <a:spLocks noGrp="1"/>
           </p:cNvSpPr>
@@ -2045,7 +1944,7 @@
         <p:spPr>
           <a:xfrm>
             <a:off x="457200" y="205920"/>
-            <a:ext cx="8229240" cy="856800"/>
+            <a:ext cx="8228880" cy="856440"/>
           </a:xfrm>
           <a:prstGeom prst="rect">
             <a:avLst/>
@@ -2054,18 +1953,16 @@
         <p:txBody>
           <a:bodyPr lIns="0" rIns="0" tIns="0" bIns="0" anchor="ctr"/>
           <a:p>
-            <a:endParaRPr b="0" lang="en-US" sz="1800" spc="-1" strike="noStrike">
-              <a:solidFill>
-                <a:srgbClr val="000000"/>
-              </a:solidFill>
-              <a:latin typeface="Calibri"/>
-            </a:endParaRPr>
-          </a:p>
-        </p:txBody>
-      </p:sp>
-      <p:sp>
-        <p:nvSpPr>
-          <p:cNvPr id="69" name="PlaceHolder 2"/>
+            <a:pPr algn="ctr"/>
+            <a:endParaRPr b="0" lang="en-US" sz="4400" spc="-1" strike="noStrike">
+              <a:latin typeface="Arial"/>
+            </a:endParaRPr>
+          </a:p>
+        </p:txBody>
+      </p:sp>
+      <p:sp>
+        <p:nvSpPr>
+          <p:cNvPr id="67" name="PlaceHolder 2"/>
           <p:cNvSpPr>
             <a:spLocks noGrp="1"/>
           </p:cNvSpPr>
@@ -2076,7 +1973,7 @@
         <p:spPr>
           <a:xfrm>
             <a:off x="457200" y="1200240"/>
-            <a:ext cx="4015800" cy="1618920"/>
+            <a:ext cx="4015440" cy="1618560"/>
           </a:xfrm>
           <a:prstGeom prst="rect">
             <a:avLst/>
@@ -2088,17 +1985,14 @@
           </a:bodyPr>
           <a:p>
             <a:endParaRPr b="0" lang="en-US" sz="3200" spc="-1" strike="noStrike">
-              <a:solidFill>
-                <a:srgbClr val="000000"/>
-              </a:solidFill>
-              <a:latin typeface="Calibri"/>
-            </a:endParaRPr>
-          </a:p>
-        </p:txBody>
-      </p:sp>
-      <p:sp>
-        <p:nvSpPr>
-          <p:cNvPr id="70" name="PlaceHolder 3"/>
+              <a:latin typeface="Arial"/>
+            </a:endParaRPr>
+          </a:p>
+        </p:txBody>
+      </p:sp>
+      <p:sp>
+        <p:nvSpPr>
+          <p:cNvPr id="68" name="PlaceHolder 3"/>
           <p:cNvSpPr>
             <a:spLocks noGrp="1"/>
           </p:cNvSpPr>
@@ -2108,8 +2002,8 @@
         </p:nvSpPr>
         <p:spPr>
           <a:xfrm>
-            <a:off x="4674240" y="1200240"/>
-            <a:ext cx="4015800" cy="1618920"/>
+            <a:off x="4673880" y="1200240"/>
+            <a:ext cx="4015440" cy="1618560"/>
           </a:xfrm>
           <a:prstGeom prst="rect">
             <a:avLst/>
@@ -2121,17 +2015,14 @@
           </a:bodyPr>
           <a:p>
             <a:endParaRPr b="0" lang="en-US" sz="3200" spc="-1" strike="noStrike">
-              <a:solidFill>
-                <a:srgbClr val="000000"/>
-              </a:solidFill>
-              <a:latin typeface="Calibri"/>
-            </a:endParaRPr>
-          </a:p>
-        </p:txBody>
-      </p:sp>
-      <p:sp>
-        <p:nvSpPr>
-          <p:cNvPr id="71" name="PlaceHolder 4"/>
+              <a:latin typeface="Arial"/>
+            </a:endParaRPr>
+          </a:p>
+        </p:txBody>
+      </p:sp>
+      <p:sp>
+        <p:nvSpPr>
+          <p:cNvPr id="69" name="PlaceHolder 4"/>
           <p:cNvSpPr>
             <a:spLocks noGrp="1"/>
           </p:cNvSpPr>
@@ -2141,8 +2032,8 @@
         </p:nvSpPr>
         <p:spPr>
           <a:xfrm>
-            <a:off x="457200" y="2973240"/>
-            <a:ext cx="4015800" cy="1618920"/>
+            <a:off x="457200" y="2972880"/>
+            <a:ext cx="4015440" cy="1618560"/>
           </a:xfrm>
           <a:prstGeom prst="rect">
             <a:avLst/>
@@ -2154,17 +2045,14 @@
           </a:bodyPr>
           <a:p>
             <a:endParaRPr b="0" lang="en-US" sz="3200" spc="-1" strike="noStrike">
-              <a:solidFill>
-                <a:srgbClr val="000000"/>
-              </a:solidFill>
-              <a:latin typeface="Calibri"/>
-            </a:endParaRPr>
-          </a:p>
-        </p:txBody>
-      </p:sp>
-      <p:sp>
-        <p:nvSpPr>
-          <p:cNvPr id="72" name="PlaceHolder 5"/>
+              <a:latin typeface="Arial"/>
+            </a:endParaRPr>
+          </a:p>
+        </p:txBody>
+      </p:sp>
+      <p:sp>
+        <p:nvSpPr>
+          <p:cNvPr id="70" name="PlaceHolder 5"/>
           <p:cNvSpPr>
             <a:spLocks noGrp="1"/>
           </p:cNvSpPr>
@@ -2174,8 +2062,8 @@
         </p:nvSpPr>
         <p:spPr>
           <a:xfrm>
-            <a:off x="4674240" y="2973240"/>
-            <a:ext cx="4015800" cy="1618920"/>
+            <a:off x="4673880" y="2972880"/>
+            <a:ext cx="4015440" cy="1618560"/>
           </a:xfrm>
           <a:prstGeom prst="rect">
             <a:avLst/>
@@ -2187,10 +2075,7 @@
           </a:bodyPr>
           <a:p>
             <a:endParaRPr b="0" lang="en-US" sz="3200" spc="-1" strike="noStrike">
-              <a:solidFill>
-                <a:srgbClr val="000000"/>
-              </a:solidFill>
-              <a:latin typeface="Calibri"/>
+              <a:latin typeface="Arial"/>
             </a:endParaRPr>
           </a:p>
         </p:txBody>
@@ -2219,7 +2104,7 @@
       </p:grpSpPr>
       <p:sp>
         <p:nvSpPr>
-          <p:cNvPr id="73" name="PlaceHolder 1"/>
+          <p:cNvPr id="71" name="PlaceHolder 1"/>
           <p:cNvSpPr>
             <a:spLocks noGrp="1"/>
           </p:cNvSpPr>
@@ -2230,7 +2115,7 @@
         <p:spPr>
           <a:xfrm>
             <a:off x="457200" y="205920"/>
-            <a:ext cx="8229240" cy="856800"/>
+            <a:ext cx="8228880" cy="856440"/>
           </a:xfrm>
           <a:prstGeom prst="rect">
             <a:avLst/>
@@ -2239,18 +2124,16 @@
         <p:txBody>
           <a:bodyPr lIns="0" rIns="0" tIns="0" bIns="0" anchor="ctr"/>
           <a:p>
-            <a:endParaRPr b="0" lang="en-US" sz="1800" spc="-1" strike="noStrike">
-              <a:solidFill>
-                <a:srgbClr val="000000"/>
-              </a:solidFill>
-              <a:latin typeface="Calibri"/>
-            </a:endParaRPr>
-          </a:p>
-        </p:txBody>
-      </p:sp>
-      <p:sp>
-        <p:nvSpPr>
-          <p:cNvPr id="74" name="PlaceHolder 2"/>
+            <a:pPr algn="ctr"/>
+            <a:endParaRPr b="0" lang="en-US" sz="4400" spc="-1" strike="noStrike">
+              <a:latin typeface="Arial"/>
+            </a:endParaRPr>
+          </a:p>
+        </p:txBody>
+      </p:sp>
+      <p:sp>
+        <p:nvSpPr>
+          <p:cNvPr id="72" name="PlaceHolder 2"/>
           <p:cNvSpPr>
             <a:spLocks noGrp="1"/>
           </p:cNvSpPr>
@@ -2261,7 +2144,7 @@
         <p:spPr>
           <a:xfrm>
             <a:off x="457200" y="1200240"/>
-            <a:ext cx="2649600" cy="1618920"/>
+            <a:ext cx="2649600" cy="1618560"/>
           </a:xfrm>
           <a:prstGeom prst="rect">
             <a:avLst/>
@@ -2273,17 +2156,14 @@
           </a:bodyPr>
           <a:p>
             <a:endParaRPr b="0" lang="en-US" sz="3200" spc="-1" strike="noStrike">
-              <a:solidFill>
-                <a:srgbClr val="000000"/>
-              </a:solidFill>
-              <a:latin typeface="Calibri"/>
-            </a:endParaRPr>
-          </a:p>
-        </p:txBody>
-      </p:sp>
-      <p:sp>
-        <p:nvSpPr>
-          <p:cNvPr id="75" name="PlaceHolder 3"/>
+              <a:latin typeface="Arial"/>
+            </a:endParaRPr>
+          </a:p>
+        </p:txBody>
+      </p:sp>
+      <p:sp>
+        <p:nvSpPr>
+          <p:cNvPr id="73" name="PlaceHolder 3"/>
           <p:cNvSpPr>
             <a:spLocks noGrp="1"/>
           </p:cNvSpPr>
@@ -2294,7 +2174,7 @@
         <p:spPr>
           <a:xfrm>
             <a:off x="3239640" y="1200240"/>
-            <a:ext cx="2649600" cy="1618920"/>
+            <a:ext cx="2649600" cy="1618560"/>
           </a:xfrm>
           <a:prstGeom prst="rect">
             <a:avLst/>
@@ -2306,17 +2186,14 @@
           </a:bodyPr>
           <a:p>
             <a:endParaRPr b="0" lang="en-US" sz="3200" spc="-1" strike="noStrike">
-              <a:solidFill>
-                <a:srgbClr val="000000"/>
-              </a:solidFill>
-              <a:latin typeface="Calibri"/>
-            </a:endParaRPr>
-          </a:p>
-        </p:txBody>
-      </p:sp>
-      <p:sp>
-        <p:nvSpPr>
-          <p:cNvPr id="76" name="PlaceHolder 4"/>
+              <a:latin typeface="Arial"/>
+            </a:endParaRPr>
+          </a:p>
+        </p:txBody>
+      </p:sp>
+      <p:sp>
+        <p:nvSpPr>
+          <p:cNvPr id="74" name="PlaceHolder 4"/>
           <p:cNvSpPr>
             <a:spLocks noGrp="1"/>
           </p:cNvSpPr>
@@ -2327,7 +2204,7 @@
         <p:spPr>
           <a:xfrm>
             <a:off x="6022080" y="1200240"/>
-            <a:ext cx="2649600" cy="1618920"/>
+            <a:ext cx="2649600" cy="1618560"/>
           </a:xfrm>
           <a:prstGeom prst="rect">
             <a:avLst/>
@@ -2339,17 +2216,14 @@
           </a:bodyPr>
           <a:p>
             <a:endParaRPr b="0" lang="en-US" sz="3200" spc="-1" strike="noStrike">
-              <a:solidFill>
-                <a:srgbClr val="000000"/>
-              </a:solidFill>
-              <a:latin typeface="Calibri"/>
-            </a:endParaRPr>
-          </a:p>
-        </p:txBody>
-      </p:sp>
-      <p:sp>
-        <p:nvSpPr>
-          <p:cNvPr id="77" name="PlaceHolder 5"/>
+              <a:latin typeface="Arial"/>
+            </a:endParaRPr>
+          </a:p>
+        </p:txBody>
+      </p:sp>
+      <p:sp>
+        <p:nvSpPr>
+          <p:cNvPr id="75" name="PlaceHolder 5"/>
           <p:cNvSpPr>
             <a:spLocks noGrp="1"/>
           </p:cNvSpPr>
@@ -2359,8 +2233,8 @@
         </p:nvSpPr>
         <p:spPr>
           <a:xfrm>
-            <a:off x="457200" y="2973240"/>
-            <a:ext cx="2649600" cy="1618920"/>
+            <a:off x="457200" y="2972880"/>
+            <a:ext cx="2649600" cy="1618560"/>
           </a:xfrm>
           <a:prstGeom prst="rect">
             <a:avLst/>
@@ -2372,17 +2246,14 @@
           </a:bodyPr>
           <a:p>
             <a:endParaRPr b="0" lang="en-US" sz="3200" spc="-1" strike="noStrike">
-              <a:solidFill>
-                <a:srgbClr val="000000"/>
-              </a:solidFill>
-              <a:latin typeface="Calibri"/>
-            </a:endParaRPr>
-          </a:p>
-        </p:txBody>
-      </p:sp>
-      <p:sp>
-        <p:nvSpPr>
-          <p:cNvPr id="78" name="PlaceHolder 6"/>
+              <a:latin typeface="Arial"/>
+            </a:endParaRPr>
+          </a:p>
+        </p:txBody>
+      </p:sp>
+      <p:sp>
+        <p:nvSpPr>
+          <p:cNvPr id="76" name="PlaceHolder 6"/>
           <p:cNvSpPr>
             <a:spLocks noGrp="1"/>
           </p:cNvSpPr>
@@ -2392,8 +2263,8 @@
         </p:nvSpPr>
         <p:spPr>
           <a:xfrm>
-            <a:off x="3239640" y="2973240"/>
-            <a:ext cx="2649600" cy="1618920"/>
+            <a:off x="3239640" y="2972880"/>
+            <a:ext cx="2649600" cy="1618560"/>
           </a:xfrm>
           <a:prstGeom prst="rect">
             <a:avLst/>
@@ -2405,17 +2276,14 @@
           </a:bodyPr>
           <a:p>
             <a:endParaRPr b="0" lang="en-US" sz="3200" spc="-1" strike="noStrike">
-              <a:solidFill>
-                <a:srgbClr val="000000"/>
-              </a:solidFill>
-              <a:latin typeface="Calibri"/>
-            </a:endParaRPr>
-          </a:p>
-        </p:txBody>
-      </p:sp>
-      <p:sp>
-        <p:nvSpPr>
-          <p:cNvPr id="79" name="PlaceHolder 7"/>
+              <a:latin typeface="Arial"/>
+            </a:endParaRPr>
+          </a:p>
+        </p:txBody>
+      </p:sp>
+      <p:sp>
+        <p:nvSpPr>
+          <p:cNvPr id="77" name="PlaceHolder 7"/>
           <p:cNvSpPr>
             <a:spLocks noGrp="1"/>
           </p:cNvSpPr>
@@ -2425,8 +2293,8 @@
         </p:nvSpPr>
         <p:spPr>
           <a:xfrm>
-            <a:off x="6022080" y="2973240"/>
-            <a:ext cx="2649600" cy="1618920"/>
+            <a:off x="6022080" y="2972880"/>
+            <a:ext cx="2649600" cy="1618560"/>
           </a:xfrm>
           <a:prstGeom prst="rect">
             <a:avLst/>
@@ -2438,10 +2306,7 @@
           </a:bodyPr>
           <a:p>
             <a:endParaRPr b="0" lang="en-US" sz="3200" spc="-1" strike="noStrike">
-              <a:solidFill>
-                <a:srgbClr val="000000"/>
-              </a:solidFill>
-              <a:latin typeface="Calibri"/>
+              <a:latin typeface="Arial"/>
             </a:endParaRPr>
           </a:p>
         </p:txBody>
@@ -2470,7 +2335,7 @@
       </p:grpSpPr>
       <p:sp>
         <p:nvSpPr>
-          <p:cNvPr id="6" name="PlaceHolder 1"/>
+          <p:cNvPr id="5" name="PlaceHolder 1"/>
           <p:cNvSpPr>
             <a:spLocks noGrp="1"/>
           </p:cNvSpPr>
@@ -2481,7 +2346,7 @@
         <p:spPr>
           <a:xfrm>
             <a:off x="457200" y="205920"/>
-            <a:ext cx="8229240" cy="856800"/>
+            <a:ext cx="8228880" cy="856440"/>
           </a:xfrm>
           <a:prstGeom prst="rect">
             <a:avLst/>
@@ -2490,18 +2355,16 @@
         <p:txBody>
           <a:bodyPr lIns="0" rIns="0" tIns="0" bIns="0" anchor="ctr"/>
           <a:p>
-            <a:endParaRPr b="0" lang="en-US" sz="1800" spc="-1" strike="noStrike">
-              <a:solidFill>
-                <a:srgbClr val="000000"/>
-              </a:solidFill>
-              <a:latin typeface="Calibri"/>
-            </a:endParaRPr>
-          </a:p>
-        </p:txBody>
-      </p:sp>
-      <p:sp>
-        <p:nvSpPr>
-          <p:cNvPr id="7" name="PlaceHolder 2"/>
+            <a:pPr algn="ctr"/>
+            <a:endParaRPr b="0" lang="en-US" sz="4400" spc="-1" strike="noStrike">
+              <a:latin typeface="Arial"/>
+            </a:endParaRPr>
+          </a:p>
+        </p:txBody>
+      </p:sp>
+      <p:sp>
+        <p:nvSpPr>
+          <p:cNvPr id="6" name="PlaceHolder 2"/>
           <p:cNvSpPr>
             <a:spLocks noGrp="1"/>
           </p:cNvSpPr>
@@ -2512,7 +2375,7 @@
         <p:spPr>
           <a:xfrm>
             <a:off x="457200" y="1200240"/>
-            <a:ext cx="8229240" cy="3394080"/>
+            <a:ext cx="8228880" cy="3393720"/>
           </a:xfrm>
           <a:prstGeom prst="rect">
             <a:avLst/>
@@ -2524,10 +2387,7 @@
           </a:bodyPr>
           <a:p>
             <a:endParaRPr b="0" lang="en-US" sz="3200" spc="-1" strike="noStrike">
-              <a:solidFill>
-                <a:srgbClr val="000000"/>
-              </a:solidFill>
-              <a:latin typeface="Calibri"/>
+              <a:latin typeface="Arial"/>
             </a:endParaRPr>
           </a:p>
         </p:txBody>
@@ -2556,7 +2416,7 @@
       </p:grpSpPr>
       <p:sp>
         <p:nvSpPr>
-          <p:cNvPr id="8" name="PlaceHolder 1"/>
+          <p:cNvPr id="7" name="PlaceHolder 1"/>
           <p:cNvSpPr>
             <a:spLocks noGrp="1"/>
           </p:cNvSpPr>
@@ -2567,7 +2427,7 @@
         <p:spPr>
           <a:xfrm>
             <a:off x="457200" y="205920"/>
-            <a:ext cx="8229240" cy="856800"/>
+            <a:ext cx="8228880" cy="856440"/>
           </a:xfrm>
           <a:prstGeom prst="rect">
             <a:avLst/>
@@ -2576,18 +2436,16 @@
         <p:txBody>
           <a:bodyPr lIns="0" rIns="0" tIns="0" bIns="0" anchor="ctr"/>
           <a:p>
-            <a:endParaRPr b="0" lang="en-US" sz="1800" spc="-1" strike="noStrike">
-              <a:solidFill>
-                <a:srgbClr val="000000"/>
-              </a:solidFill>
-              <a:latin typeface="Calibri"/>
-            </a:endParaRPr>
-          </a:p>
-        </p:txBody>
-      </p:sp>
-      <p:sp>
-        <p:nvSpPr>
-          <p:cNvPr id="9" name="PlaceHolder 2"/>
+            <a:pPr algn="ctr"/>
+            <a:endParaRPr b="0" lang="en-US" sz="4400" spc="-1" strike="noStrike">
+              <a:latin typeface="Arial"/>
+            </a:endParaRPr>
+          </a:p>
+        </p:txBody>
+      </p:sp>
+      <p:sp>
+        <p:nvSpPr>
+          <p:cNvPr id="8" name="PlaceHolder 2"/>
           <p:cNvSpPr>
             <a:spLocks noGrp="1"/>
           </p:cNvSpPr>
@@ -2598,7 +2456,7 @@
         <p:spPr>
           <a:xfrm>
             <a:off x="457200" y="1200240"/>
-            <a:ext cx="4015800" cy="3394080"/>
+            <a:ext cx="4015440" cy="3393720"/>
           </a:xfrm>
           <a:prstGeom prst="rect">
             <a:avLst/>
@@ -2610,17 +2468,14 @@
           </a:bodyPr>
           <a:p>
             <a:endParaRPr b="0" lang="en-US" sz="3200" spc="-1" strike="noStrike">
-              <a:solidFill>
-                <a:srgbClr val="000000"/>
-              </a:solidFill>
-              <a:latin typeface="Calibri"/>
-            </a:endParaRPr>
-          </a:p>
-        </p:txBody>
-      </p:sp>
-      <p:sp>
-        <p:nvSpPr>
-          <p:cNvPr id="10" name="PlaceHolder 3"/>
+              <a:latin typeface="Arial"/>
+            </a:endParaRPr>
+          </a:p>
+        </p:txBody>
+      </p:sp>
+      <p:sp>
+        <p:nvSpPr>
+          <p:cNvPr id="9" name="PlaceHolder 3"/>
           <p:cNvSpPr>
             <a:spLocks noGrp="1"/>
           </p:cNvSpPr>
@@ -2630,8 +2485,8 @@
         </p:nvSpPr>
         <p:spPr>
           <a:xfrm>
-            <a:off x="4674240" y="1200240"/>
-            <a:ext cx="4015800" cy="3394080"/>
+            <a:off x="4673880" y="1200240"/>
+            <a:ext cx="4015440" cy="3393720"/>
           </a:xfrm>
           <a:prstGeom prst="rect">
             <a:avLst/>
@@ -2643,10 +2498,7 @@
           </a:bodyPr>
           <a:p>
             <a:endParaRPr b="0" lang="en-US" sz="3200" spc="-1" strike="noStrike">
-              <a:solidFill>
-                <a:srgbClr val="000000"/>
-              </a:solidFill>
-              <a:latin typeface="Calibri"/>
+              <a:latin typeface="Arial"/>
             </a:endParaRPr>
           </a:p>
         </p:txBody>
@@ -2675,7 +2527,7 @@
       </p:grpSpPr>
       <p:sp>
         <p:nvSpPr>
-          <p:cNvPr id="11" name="PlaceHolder 1"/>
+          <p:cNvPr id="10" name="PlaceHolder 1"/>
           <p:cNvSpPr>
             <a:spLocks noGrp="1"/>
           </p:cNvSpPr>
@@ -2686,7 +2538,7 @@
         <p:spPr>
           <a:xfrm>
             <a:off x="457200" y="205920"/>
-            <a:ext cx="8229240" cy="856800"/>
+            <a:ext cx="8228880" cy="856440"/>
           </a:xfrm>
           <a:prstGeom prst="rect">
             <a:avLst/>
@@ -2695,11 +2547,9 @@
         <p:txBody>
           <a:bodyPr lIns="0" rIns="0" tIns="0" bIns="0" anchor="ctr"/>
           <a:p>
-            <a:endParaRPr b="0" lang="en-US" sz="1800" spc="-1" strike="noStrike">
-              <a:solidFill>
-                <a:srgbClr val="000000"/>
-              </a:solidFill>
-              <a:latin typeface="Calibri"/>
+            <a:pPr algn="ctr"/>
+            <a:endParaRPr b="0" lang="en-US" sz="4400" spc="-1" strike="noStrike">
+              <a:latin typeface="Arial"/>
             </a:endParaRPr>
           </a:p>
         </p:txBody>
@@ -2728,7 +2578,7 @@
       </p:grpSpPr>
       <p:sp>
         <p:nvSpPr>
-          <p:cNvPr id="12" name="PlaceHolder 1"/>
+          <p:cNvPr id="11" name="PlaceHolder 1"/>
           <p:cNvSpPr>
             <a:spLocks noGrp="1"/>
           </p:cNvSpPr>
@@ -2739,7 +2589,7 @@
         <p:spPr>
           <a:xfrm>
             <a:off x="457200" y="205920"/>
-            <a:ext cx="8229240" cy="3972960"/>
+            <a:ext cx="8228880" cy="3971160"/>
           </a:xfrm>
           <a:prstGeom prst="rect">
             <a:avLst/>
@@ -2779,7 +2629,7 @@
       </p:grpSpPr>
       <p:sp>
         <p:nvSpPr>
-          <p:cNvPr id="13" name="PlaceHolder 1"/>
+          <p:cNvPr id="12" name="PlaceHolder 1"/>
           <p:cNvSpPr>
             <a:spLocks noGrp="1"/>
           </p:cNvSpPr>
@@ -2790,7 +2640,7 @@
         <p:spPr>
           <a:xfrm>
             <a:off x="457200" y="205920"/>
-            <a:ext cx="8229240" cy="856800"/>
+            <a:ext cx="8228880" cy="856440"/>
           </a:xfrm>
           <a:prstGeom prst="rect">
             <a:avLst/>
@@ -2799,18 +2649,16 @@
         <p:txBody>
           <a:bodyPr lIns="0" rIns="0" tIns="0" bIns="0" anchor="ctr"/>
           <a:p>
-            <a:endParaRPr b="0" lang="en-US" sz="1800" spc="-1" strike="noStrike">
-              <a:solidFill>
-                <a:srgbClr val="000000"/>
-              </a:solidFill>
-              <a:latin typeface="Calibri"/>
-            </a:endParaRPr>
-          </a:p>
-        </p:txBody>
-      </p:sp>
-      <p:sp>
-        <p:nvSpPr>
-          <p:cNvPr id="14" name="PlaceHolder 2"/>
+            <a:pPr algn="ctr"/>
+            <a:endParaRPr b="0" lang="en-US" sz="4400" spc="-1" strike="noStrike">
+              <a:latin typeface="Arial"/>
+            </a:endParaRPr>
+          </a:p>
+        </p:txBody>
+      </p:sp>
+      <p:sp>
+        <p:nvSpPr>
+          <p:cNvPr id="13" name="PlaceHolder 2"/>
           <p:cNvSpPr>
             <a:spLocks noGrp="1"/>
           </p:cNvSpPr>
@@ -2821,7 +2669,7 @@
         <p:spPr>
           <a:xfrm>
             <a:off x="457200" y="1200240"/>
-            <a:ext cx="4015800" cy="1618920"/>
+            <a:ext cx="4015440" cy="1618560"/>
           </a:xfrm>
           <a:prstGeom prst="rect">
             <a:avLst/>
@@ -2833,17 +2681,14 @@
           </a:bodyPr>
           <a:p>
             <a:endParaRPr b="0" lang="en-US" sz="3200" spc="-1" strike="noStrike">
-              <a:solidFill>
-                <a:srgbClr val="000000"/>
-              </a:solidFill>
-              <a:latin typeface="Calibri"/>
-            </a:endParaRPr>
-          </a:p>
-        </p:txBody>
-      </p:sp>
-      <p:sp>
-        <p:nvSpPr>
-          <p:cNvPr id="15" name="PlaceHolder 3"/>
+              <a:latin typeface="Arial"/>
+            </a:endParaRPr>
+          </a:p>
+        </p:txBody>
+      </p:sp>
+      <p:sp>
+        <p:nvSpPr>
+          <p:cNvPr id="14" name="PlaceHolder 3"/>
           <p:cNvSpPr>
             <a:spLocks noGrp="1"/>
           </p:cNvSpPr>
@@ -2853,8 +2698,8 @@
         </p:nvSpPr>
         <p:spPr>
           <a:xfrm>
-            <a:off x="4674240" y="1200240"/>
-            <a:ext cx="4015800" cy="3394080"/>
+            <a:off x="4673880" y="1200240"/>
+            <a:ext cx="4015440" cy="3393720"/>
           </a:xfrm>
           <a:prstGeom prst="rect">
             <a:avLst/>
@@ -2866,17 +2711,14 @@
           </a:bodyPr>
           <a:p>
             <a:endParaRPr b="0" lang="en-US" sz="3200" spc="-1" strike="noStrike">
-              <a:solidFill>
-                <a:srgbClr val="000000"/>
-              </a:solidFill>
-              <a:latin typeface="Calibri"/>
-            </a:endParaRPr>
-          </a:p>
-        </p:txBody>
-      </p:sp>
-      <p:sp>
-        <p:nvSpPr>
-          <p:cNvPr id="16" name="PlaceHolder 4"/>
+              <a:latin typeface="Arial"/>
+            </a:endParaRPr>
+          </a:p>
+        </p:txBody>
+      </p:sp>
+      <p:sp>
+        <p:nvSpPr>
+          <p:cNvPr id="15" name="PlaceHolder 4"/>
           <p:cNvSpPr>
             <a:spLocks noGrp="1"/>
           </p:cNvSpPr>
@@ -2886,8 +2728,8 @@
         </p:nvSpPr>
         <p:spPr>
           <a:xfrm>
-            <a:off x="457200" y="2973240"/>
-            <a:ext cx="4015800" cy="1618920"/>
+            <a:off x="457200" y="2972880"/>
+            <a:ext cx="4015440" cy="1618560"/>
           </a:xfrm>
           <a:prstGeom prst="rect">
             <a:avLst/>
@@ -2899,10 +2741,7 @@
           </a:bodyPr>
           <a:p>
             <a:endParaRPr b="0" lang="en-US" sz="3200" spc="-1" strike="noStrike">
-              <a:solidFill>
-                <a:srgbClr val="000000"/>
-              </a:solidFill>
-              <a:latin typeface="Calibri"/>
+              <a:latin typeface="Arial"/>
             </a:endParaRPr>
           </a:p>
         </p:txBody>
@@ -2931,7 +2770,7 @@
       </p:grpSpPr>
       <p:sp>
         <p:nvSpPr>
-          <p:cNvPr id="17" name="PlaceHolder 1"/>
+          <p:cNvPr id="16" name="PlaceHolder 1"/>
           <p:cNvSpPr>
             <a:spLocks noGrp="1"/>
           </p:cNvSpPr>
@@ -2942,7 +2781,7 @@
         <p:spPr>
           <a:xfrm>
             <a:off x="457200" y="205920"/>
-            <a:ext cx="8229240" cy="856800"/>
+            <a:ext cx="8228880" cy="856440"/>
           </a:xfrm>
           <a:prstGeom prst="rect">
             <a:avLst/>
@@ -2951,18 +2790,16 @@
         <p:txBody>
           <a:bodyPr lIns="0" rIns="0" tIns="0" bIns="0" anchor="ctr"/>
           <a:p>
-            <a:endParaRPr b="0" lang="en-US" sz="1800" spc="-1" strike="noStrike">
-              <a:solidFill>
-                <a:srgbClr val="000000"/>
-              </a:solidFill>
-              <a:latin typeface="Calibri"/>
-            </a:endParaRPr>
-          </a:p>
-        </p:txBody>
-      </p:sp>
-      <p:sp>
-        <p:nvSpPr>
-          <p:cNvPr id="18" name="PlaceHolder 2"/>
+            <a:pPr algn="ctr"/>
+            <a:endParaRPr b="0" lang="en-US" sz="4400" spc="-1" strike="noStrike">
+              <a:latin typeface="Arial"/>
+            </a:endParaRPr>
+          </a:p>
+        </p:txBody>
+      </p:sp>
+      <p:sp>
+        <p:nvSpPr>
+          <p:cNvPr id="17" name="PlaceHolder 2"/>
           <p:cNvSpPr>
             <a:spLocks noGrp="1"/>
           </p:cNvSpPr>
@@ -2973,7 +2810,7 @@
         <p:spPr>
           <a:xfrm>
             <a:off x="457200" y="1200240"/>
-            <a:ext cx="4015800" cy="3394080"/>
+            <a:ext cx="4015440" cy="3393720"/>
           </a:xfrm>
           <a:prstGeom prst="rect">
             <a:avLst/>
@@ -2985,17 +2822,14 @@
           </a:bodyPr>
           <a:p>
             <a:endParaRPr b="0" lang="en-US" sz="3200" spc="-1" strike="noStrike">
-              <a:solidFill>
-                <a:srgbClr val="000000"/>
-              </a:solidFill>
-              <a:latin typeface="Calibri"/>
-            </a:endParaRPr>
-          </a:p>
-        </p:txBody>
-      </p:sp>
-      <p:sp>
-        <p:nvSpPr>
-          <p:cNvPr id="19" name="PlaceHolder 3"/>
+              <a:latin typeface="Arial"/>
+            </a:endParaRPr>
+          </a:p>
+        </p:txBody>
+      </p:sp>
+      <p:sp>
+        <p:nvSpPr>
+          <p:cNvPr id="18" name="PlaceHolder 3"/>
           <p:cNvSpPr>
             <a:spLocks noGrp="1"/>
           </p:cNvSpPr>
@@ -3005,8 +2839,8 @@
         </p:nvSpPr>
         <p:spPr>
           <a:xfrm>
-            <a:off x="4674240" y="1200240"/>
-            <a:ext cx="4015800" cy="1618920"/>
+            <a:off x="4673880" y="1200240"/>
+            <a:ext cx="4015440" cy="1618560"/>
           </a:xfrm>
           <a:prstGeom prst="rect">
             <a:avLst/>
@@ -3018,17 +2852,14 @@
           </a:bodyPr>
           <a:p>
             <a:endParaRPr b="0" lang="en-US" sz="3200" spc="-1" strike="noStrike">
-              <a:solidFill>
-                <a:srgbClr val="000000"/>
-              </a:solidFill>
-              <a:latin typeface="Calibri"/>
-            </a:endParaRPr>
-          </a:p>
-        </p:txBody>
-      </p:sp>
-      <p:sp>
-        <p:nvSpPr>
-          <p:cNvPr id="20" name="PlaceHolder 4"/>
+              <a:latin typeface="Arial"/>
+            </a:endParaRPr>
+          </a:p>
+        </p:txBody>
+      </p:sp>
+      <p:sp>
+        <p:nvSpPr>
+          <p:cNvPr id="19" name="PlaceHolder 4"/>
           <p:cNvSpPr>
             <a:spLocks noGrp="1"/>
           </p:cNvSpPr>
@@ -3038,8 +2869,8 @@
         </p:nvSpPr>
         <p:spPr>
           <a:xfrm>
-            <a:off x="4674240" y="2973240"/>
-            <a:ext cx="4015800" cy="1618920"/>
+            <a:off x="4673880" y="2972880"/>
+            <a:ext cx="4015440" cy="1618560"/>
           </a:xfrm>
           <a:prstGeom prst="rect">
             <a:avLst/>
@@ -3051,10 +2882,7 @@
           </a:bodyPr>
           <a:p>
             <a:endParaRPr b="0" lang="en-US" sz="3200" spc="-1" strike="noStrike">
-              <a:solidFill>
-                <a:srgbClr val="000000"/>
-              </a:solidFill>
-              <a:latin typeface="Calibri"/>
+              <a:latin typeface="Arial"/>
             </a:endParaRPr>
           </a:p>
         </p:txBody>
@@ -3083,7 +2911,7 @@
       </p:grpSpPr>
       <p:sp>
         <p:nvSpPr>
-          <p:cNvPr id="21" name="PlaceHolder 1"/>
+          <p:cNvPr id="20" name="PlaceHolder 1"/>
           <p:cNvSpPr>
             <a:spLocks noGrp="1"/>
           </p:cNvSpPr>
@@ -3094,7 +2922,7 @@
         <p:spPr>
           <a:xfrm>
             <a:off x="457200" y="205920"/>
-            <a:ext cx="8229240" cy="856800"/>
+            <a:ext cx="8228880" cy="856440"/>
           </a:xfrm>
           <a:prstGeom prst="rect">
             <a:avLst/>
@@ -3103,18 +2931,16 @@
         <p:txBody>
           <a:bodyPr lIns="0" rIns="0" tIns="0" bIns="0" anchor="ctr"/>
           <a:p>
-            <a:endParaRPr b="0" lang="en-US" sz="1800" spc="-1" strike="noStrike">
-              <a:solidFill>
-                <a:srgbClr val="000000"/>
-              </a:solidFill>
-              <a:latin typeface="Calibri"/>
-            </a:endParaRPr>
-          </a:p>
-        </p:txBody>
-      </p:sp>
-      <p:sp>
-        <p:nvSpPr>
-          <p:cNvPr id="22" name="PlaceHolder 2"/>
+            <a:pPr algn="ctr"/>
+            <a:endParaRPr b="0" lang="en-US" sz="4400" spc="-1" strike="noStrike">
+              <a:latin typeface="Arial"/>
+            </a:endParaRPr>
+          </a:p>
+        </p:txBody>
+      </p:sp>
+      <p:sp>
+        <p:nvSpPr>
+          <p:cNvPr id="21" name="PlaceHolder 2"/>
           <p:cNvSpPr>
             <a:spLocks noGrp="1"/>
           </p:cNvSpPr>
@@ -3125,7 +2951,7 @@
         <p:spPr>
           <a:xfrm>
             <a:off x="457200" y="1200240"/>
-            <a:ext cx="4015800" cy="1618920"/>
+            <a:ext cx="4015440" cy="1618560"/>
           </a:xfrm>
           <a:prstGeom prst="rect">
             <a:avLst/>
@@ -3137,17 +2963,14 @@
           </a:bodyPr>
           <a:p>
             <a:endParaRPr b="0" lang="en-US" sz="3200" spc="-1" strike="noStrike">
-              <a:solidFill>
-                <a:srgbClr val="000000"/>
-              </a:solidFill>
-              <a:latin typeface="Calibri"/>
-            </a:endParaRPr>
-          </a:p>
-        </p:txBody>
-      </p:sp>
-      <p:sp>
-        <p:nvSpPr>
-          <p:cNvPr id="23" name="PlaceHolder 3"/>
+              <a:latin typeface="Arial"/>
+            </a:endParaRPr>
+          </a:p>
+        </p:txBody>
+      </p:sp>
+      <p:sp>
+        <p:nvSpPr>
+          <p:cNvPr id="22" name="PlaceHolder 3"/>
           <p:cNvSpPr>
             <a:spLocks noGrp="1"/>
           </p:cNvSpPr>
@@ -3157,8 +2980,8 @@
         </p:nvSpPr>
         <p:spPr>
           <a:xfrm>
-            <a:off x="4674240" y="1200240"/>
-            <a:ext cx="4015800" cy="1618920"/>
+            <a:off x="4673880" y="1200240"/>
+            <a:ext cx="4015440" cy="1618560"/>
           </a:xfrm>
           <a:prstGeom prst="rect">
             <a:avLst/>
@@ -3170,17 +2993,14 @@
           </a:bodyPr>
           <a:p>
             <a:endParaRPr b="0" lang="en-US" sz="3200" spc="-1" strike="noStrike">
-              <a:solidFill>
-                <a:srgbClr val="000000"/>
-              </a:solidFill>
-              <a:latin typeface="Calibri"/>
-            </a:endParaRPr>
-          </a:p>
-        </p:txBody>
-      </p:sp>
-      <p:sp>
-        <p:nvSpPr>
-          <p:cNvPr id="24" name="PlaceHolder 4"/>
+              <a:latin typeface="Arial"/>
+            </a:endParaRPr>
+          </a:p>
+        </p:txBody>
+      </p:sp>
+      <p:sp>
+        <p:nvSpPr>
+          <p:cNvPr id="23" name="PlaceHolder 4"/>
           <p:cNvSpPr>
             <a:spLocks noGrp="1"/>
           </p:cNvSpPr>
@@ -3190,8 +3010,8 @@
         </p:nvSpPr>
         <p:spPr>
           <a:xfrm>
-            <a:off x="457200" y="2973240"/>
-            <a:ext cx="8229240" cy="1618920"/>
+            <a:off x="457200" y="2972880"/>
+            <a:ext cx="8228880" cy="1618560"/>
           </a:xfrm>
           <a:prstGeom prst="rect">
             <a:avLst/>
@@ -3203,10 +3023,7 @@
           </a:bodyPr>
           <a:p>
             <a:endParaRPr b="0" lang="en-US" sz="3200" spc="-1" strike="noStrike">
-              <a:solidFill>
-                <a:srgbClr val="000000"/>
-              </a:solidFill>
-              <a:latin typeface="Calibri"/>
+              <a:latin typeface="Arial"/>
             </a:endParaRPr>
           </a:p>
         </p:txBody>
@@ -3249,7 +3066,7 @@
         <p:spPr>
           <a:xfrm>
             <a:off x="3189960" y="4731480"/>
-            <a:ext cx="2474640" cy="302760"/>
+            <a:ext cx="2474280" cy="302400"/>
           </a:xfrm>
           <a:prstGeom prst="rect">
             <a:avLst/>
@@ -3301,232 +3118,203 @@
         </p:nvSpPr>
         <p:spPr>
           <a:xfrm>
-            <a:off x="685800" y="1597680"/>
-            <a:ext cx="7772040" cy="1102320"/>
-          </a:xfrm>
-          <a:prstGeom prst="rect">
-            <a:avLst/>
-          </a:prstGeom>
-        </p:spPr>
-        <p:txBody>
-          <a:bodyPr lIns="45720" rIns="45720" tIns="45000" bIns="45000" anchor="ctr"/>
-          <a:p>
-            <a:pPr algn="ctr">
-              <a:lnSpc>
-                <a:spcPct val="100000"/>
-              </a:lnSpc>
-            </a:pPr>
+            <a:off x="457200" y="205920"/>
+            <a:ext cx="8228880" cy="856440"/>
+          </a:xfrm>
+          <a:prstGeom prst="rect">
+            <a:avLst/>
+          </a:prstGeom>
+        </p:spPr>
+        <p:txBody>
+          <a:bodyPr lIns="0" rIns="0" tIns="0" bIns="0" anchor="ctr"/>
+          <a:p>
             <a:r>
-              <a:rPr b="0" lang="en-US" sz="4400" spc="-1" strike="noStrike">
-                <a:solidFill>
-                  <a:srgbClr val="000000"/>
-                </a:solidFill>
-                <a:latin typeface="Calibri"/>
-                <a:ea typeface="Calibri"/>
+              <a:rPr b="0" lang="en-US" sz="1800" spc="-1" strike="noStrike">
+                <a:latin typeface="Arial"/>
               </a:rPr>
-              <a:t>Title Text</a:t>
+              <a:t>Click to edit the title text format</a:t>
             </a:r>
-            <a:endParaRPr b="0" lang="en-US" sz="4400" spc="-1" strike="noStrike">
-              <a:solidFill>
+            <a:endParaRPr b="0" lang="en-US" sz="1800" spc="-1" strike="noStrike">
+              <a:latin typeface="Arial"/>
+            </a:endParaRPr>
+          </a:p>
+        </p:txBody>
+      </p:sp>
+      <p:sp>
+        <p:nvSpPr>
+          <p:cNvPr id="2" name="PlaceHolder 3"/>
+          <p:cNvSpPr>
+            <a:spLocks noGrp="1"/>
+          </p:cNvSpPr>
+          <p:nvPr>
+            <p:ph type="body"/>
+          </p:nvPr>
+        </p:nvSpPr>
+        <p:spPr>
+          <a:xfrm>
+            <a:off x="457200" y="1203480"/>
+            <a:ext cx="8229240" cy="2982960"/>
+          </a:xfrm>
+          <a:prstGeom prst="rect">
+            <a:avLst/>
+          </a:prstGeom>
+        </p:spPr>
+        <p:txBody>
+          <a:bodyPr lIns="0" rIns="0" tIns="0" bIns="0">
+            <a:normAutofit/>
+          </a:bodyPr>
+          <a:p>
+            <a:pPr marL="432000" indent="-324000">
+              <a:spcBef>
+                <a:spcPts val="1417"/>
+              </a:spcBef>
+              <a:buClr>
                 <a:srgbClr val="000000"/>
-              </a:solidFill>
-              <a:latin typeface="Calibri"/>
-            </a:endParaRPr>
-          </a:p>
-        </p:txBody>
-      </p:sp>
-      <p:sp>
-        <p:nvSpPr>
-          <p:cNvPr id="2" name="PlaceHolder 3"/>
-          <p:cNvSpPr>
-            <a:spLocks noGrp="1"/>
-          </p:cNvSpPr>
-          <p:nvPr>
-            <p:ph type="body"/>
-          </p:nvPr>
-        </p:nvSpPr>
-        <p:spPr>
-          <a:xfrm>
-            <a:off x="1371600" y="2914560"/>
-            <a:ext cx="6400440" cy="1314000"/>
-          </a:xfrm>
-          <a:prstGeom prst="rect">
-            <a:avLst/>
-          </a:prstGeom>
-        </p:spPr>
-        <p:txBody>
-          <a:bodyPr lIns="45720" rIns="45720" tIns="45000" bIns="45000"/>
-          <a:p>
-            <a:pPr algn="ctr">
-              <a:lnSpc>
-                <a:spcPct val="100000"/>
-              </a:lnSpc>
-              <a:spcBef>
-                <a:spcPts val="700"/>
-              </a:spcBef>
+              </a:buClr>
+              <a:buSzPct val="45000"/>
+              <a:buFont typeface="Wingdings" charset="2"/>
+              <a:buChar char=""/>
             </a:pPr>
             <a:r>
               <a:rPr b="0" lang="en-US" sz="3200" spc="-1" strike="noStrike">
-                <a:solidFill>
-                  <a:srgbClr val="888888"/>
-                </a:solidFill>
-                <a:latin typeface="Calibri"/>
-                <a:ea typeface="Calibri"/>
+                <a:latin typeface="Arial"/>
               </a:rPr>
-              <a:t>Body Level One</a:t>
+              <a:t>Click to edit the outline text format</a:t>
             </a:r>
             <a:endParaRPr b="0" lang="en-US" sz="3200" spc="-1" strike="noStrike">
-              <a:solidFill>
+              <a:latin typeface="Arial"/>
+            </a:endParaRPr>
+          </a:p>
+          <a:p>
+            <a:pPr lvl="1" marL="864000" indent="-324000">
+              <a:spcBef>
+                <a:spcPts val="1134"/>
+              </a:spcBef>
+              <a:buClr>
                 <a:srgbClr val="000000"/>
-              </a:solidFill>
-              <a:latin typeface="Calibri"/>
-            </a:endParaRPr>
-          </a:p>
-          <a:p>
-            <a:pPr algn="ctr">
-              <a:lnSpc>
-                <a:spcPct val="100000"/>
-              </a:lnSpc>
-              <a:spcBef>
-                <a:spcPts val="700"/>
-              </a:spcBef>
+              </a:buClr>
+              <a:buSzPct val="75000"/>
+              <a:buFont typeface="Symbol" charset="2"/>
+              <a:buChar char=""/>
             </a:pPr>
             <a:r>
-              <a:rPr b="0" lang="en-US" sz="3200" spc="-1" strike="noStrike">
-                <a:solidFill>
-                  <a:srgbClr val="888888"/>
-                </a:solidFill>
-                <a:latin typeface="Calibri"/>
-                <a:ea typeface="Calibri"/>
+              <a:rPr b="0" lang="en-US" sz="2800" spc="-1" strike="noStrike">
+                <a:latin typeface="Arial"/>
               </a:rPr>
-              <a:t>Body Level Two</a:t>
+              <a:t>Second Outline Level</a:t>
             </a:r>
-            <a:endParaRPr b="0" lang="en-US" sz="3200" spc="-1" strike="noStrike">
-              <a:solidFill>
+            <a:endParaRPr b="0" lang="en-US" sz="2800" spc="-1" strike="noStrike">
+              <a:latin typeface="Arial"/>
+            </a:endParaRPr>
+          </a:p>
+          <a:p>
+            <a:pPr lvl="2" marL="1296000" indent="-288000">
+              <a:spcBef>
+                <a:spcPts val="850"/>
+              </a:spcBef>
+              <a:buClr>
                 <a:srgbClr val="000000"/>
-              </a:solidFill>
-              <a:latin typeface="Calibri"/>
-            </a:endParaRPr>
-          </a:p>
-          <a:p>
-            <a:pPr algn="ctr">
-              <a:lnSpc>
-                <a:spcPct val="100000"/>
-              </a:lnSpc>
-              <a:spcBef>
-                <a:spcPts val="700"/>
-              </a:spcBef>
+              </a:buClr>
+              <a:buSzPct val="45000"/>
+              <a:buFont typeface="Wingdings" charset="2"/>
+              <a:buChar char=""/>
             </a:pPr>
             <a:r>
-              <a:rPr b="0" lang="en-US" sz="3200" spc="-1" strike="noStrike">
-                <a:solidFill>
-                  <a:srgbClr val="888888"/>
-                </a:solidFill>
-                <a:latin typeface="Calibri"/>
-                <a:ea typeface="Calibri"/>
+              <a:rPr b="0" lang="en-US" sz="2400" spc="-1" strike="noStrike">
+                <a:latin typeface="Arial"/>
               </a:rPr>
-              <a:t>Body Level Three</a:t>
+              <a:t>Third Outline Level</a:t>
             </a:r>
-            <a:endParaRPr b="0" lang="en-US" sz="3200" spc="-1" strike="noStrike">
-              <a:solidFill>
+            <a:endParaRPr b="0" lang="en-US" sz="2400" spc="-1" strike="noStrike">
+              <a:latin typeface="Arial"/>
+            </a:endParaRPr>
+          </a:p>
+          <a:p>
+            <a:pPr lvl="3" marL="1728000" indent="-216000">
+              <a:spcBef>
+                <a:spcPts val="567"/>
+              </a:spcBef>
+              <a:buClr>
                 <a:srgbClr val="000000"/>
-              </a:solidFill>
-              <a:latin typeface="Calibri"/>
-            </a:endParaRPr>
-          </a:p>
-          <a:p>
-            <a:pPr algn="ctr">
-              <a:lnSpc>
-                <a:spcPct val="100000"/>
-              </a:lnSpc>
-              <a:spcBef>
-                <a:spcPts val="700"/>
-              </a:spcBef>
+              </a:buClr>
+              <a:buSzPct val="75000"/>
+              <a:buFont typeface="Symbol" charset="2"/>
+              <a:buChar char=""/>
             </a:pPr>
             <a:r>
-              <a:rPr b="0" lang="en-US" sz="3200" spc="-1" strike="noStrike">
-                <a:solidFill>
-                  <a:srgbClr val="888888"/>
-                </a:solidFill>
-                <a:latin typeface="Calibri"/>
-                <a:ea typeface="Calibri"/>
+              <a:rPr b="0" lang="en-US" sz="2000" spc="-1" strike="noStrike">
+                <a:latin typeface="Arial"/>
               </a:rPr>
-              <a:t>Body Level Four</a:t>
+              <a:t>Fourth Outline Level</a:t>
             </a:r>
-            <a:endParaRPr b="0" lang="en-US" sz="3200" spc="-1" strike="noStrike">
-              <a:solidFill>
+            <a:endParaRPr b="0" lang="en-US" sz="2000" spc="-1" strike="noStrike">
+              <a:latin typeface="Arial"/>
+            </a:endParaRPr>
+          </a:p>
+          <a:p>
+            <a:pPr lvl="4" marL="2160000" indent="-216000">
+              <a:spcBef>
+                <a:spcPts val="283"/>
+              </a:spcBef>
+              <a:buClr>
                 <a:srgbClr val="000000"/>
-              </a:solidFill>
-              <a:latin typeface="Calibri"/>
-            </a:endParaRPr>
-          </a:p>
-          <a:p>
-            <a:pPr algn="ctr">
-              <a:lnSpc>
-                <a:spcPct val="100000"/>
-              </a:lnSpc>
-              <a:spcBef>
-                <a:spcPts val="700"/>
-              </a:spcBef>
+              </a:buClr>
+              <a:buSzPct val="45000"/>
+              <a:buFont typeface="Wingdings" charset="2"/>
+              <a:buChar char=""/>
             </a:pPr>
             <a:r>
-              <a:rPr b="0" lang="en-US" sz="3200" spc="-1" strike="noStrike">
-                <a:solidFill>
-                  <a:srgbClr val="888888"/>
-                </a:solidFill>
-                <a:latin typeface="Calibri"/>
-                <a:ea typeface="Calibri"/>
+              <a:rPr b="0" lang="en-US" sz="2000" spc="-1" strike="noStrike">
+                <a:latin typeface="Arial"/>
               </a:rPr>
-              <a:t>Body Level Five</a:t>
+              <a:t>Fifth Outline Level</a:t>
             </a:r>
-            <a:endParaRPr b="0" lang="en-US" sz="3200" spc="-1" strike="noStrike">
-              <a:solidFill>
+            <a:endParaRPr b="0" lang="en-US" sz="2000" spc="-1" strike="noStrike">
+              <a:latin typeface="Arial"/>
+            </a:endParaRPr>
+          </a:p>
+          <a:p>
+            <a:pPr lvl="5" marL="2592000" indent="-216000">
+              <a:spcBef>
+                <a:spcPts val="283"/>
+              </a:spcBef>
+              <a:buClr>
                 <a:srgbClr val="000000"/>
-              </a:solidFill>
-              <a:latin typeface="Calibri"/>
-            </a:endParaRPr>
-          </a:p>
-        </p:txBody>
-      </p:sp>
-      <p:sp>
-        <p:nvSpPr>
-          <p:cNvPr id="3" name="PlaceHolder 4"/>
-          <p:cNvSpPr>
-            <a:spLocks noGrp="1"/>
-          </p:cNvSpPr>
-          <p:nvPr>
-            <p:ph type="sldNum"/>
-          </p:nvPr>
-        </p:nvSpPr>
-        <p:spPr>
-          <a:xfrm>
-            <a:off x="4419720" y="4627440"/>
-            <a:ext cx="2133360" cy="279000"/>
-          </a:xfrm>
-          <a:prstGeom prst="rect">
-            <a:avLst/>
-          </a:prstGeom>
-        </p:spPr>
-        <p:txBody>
-          <a:bodyPr lIns="45720" rIns="45720" tIns="45000" bIns="45000" anchor="ctr"/>
-          <a:p>
-            <a:pPr algn="r">
-              <a:lnSpc>
-                <a:spcPct val="100000"/>
-              </a:lnSpc>
+              </a:buClr>
+              <a:buSzPct val="45000"/>
+              <a:buFont typeface="Wingdings" charset="2"/>
+              <a:buChar char=""/>
             </a:pPr>
-            <a:fld id="{C145B86B-3E8D-4221-B202-ED3A77765BD9}" type="slidenum">
-              <a:rPr b="0" lang="en-US" sz="1200" spc="-1" strike="noStrike">
-                <a:solidFill>
-                  <a:srgbClr val="888888"/>
-                </a:solidFill>
-                <a:latin typeface="Calibri"/>
-                <a:ea typeface="Calibri"/>
+            <a:r>
+              <a:rPr b="0" lang="en-US" sz="2000" spc="-1" strike="noStrike">
+                <a:latin typeface="Arial"/>
               </a:rPr>
-              <a:t>&lt;number&gt;</a:t>
-            </a:fld>
-            <a:endParaRPr b="0" lang="en-US" sz="1200" spc="-1" strike="noStrike">
-              <a:latin typeface="Times New Roman"/>
+              <a:t>Sixth Outline Level</a:t>
+            </a:r>
+            <a:endParaRPr b="0" lang="en-US" sz="2000" spc="-1" strike="noStrike">
+              <a:latin typeface="Arial"/>
+            </a:endParaRPr>
+          </a:p>
+          <a:p>
+            <a:pPr lvl="6" marL="3024000" indent="-216000">
+              <a:spcBef>
+                <a:spcPts val="283"/>
+              </a:spcBef>
+              <a:buClr>
+                <a:srgbClr val="000000"/>
+              </a:buClr>
+              <a:buSzPct val="45000"/>
+              <a:buFont typeface="Wingdings" charset="2"/>
+              <a:buChar char=""/>
+            </a:pPr>
+            <a:r>
+              <a:rPr b="0" lang="en-US" sz="2000" spc="-1" strike="noStrike">
+                <a:latin typeface="Arial"/>
+              </a:rPr>
+              <a:t>Seventh Outline Level</a:t>
+            </a:r>
+            <a:endParaRPr b="0" lang="en-US" sz="2000" spc="-1" strike="noStrike">
+              <a:latin typeface="Arial"/>
             </a:endParaRPr>
           </a:p>
         </p:txBody>
@@ -3577,14 +3365,14 @@
       </p:grpSpPr>
       <p:sp>
         <p:nvSpPr>
-          <p:cNvPr id="40" name="CustomShape 1"/>
+          <p:cNvPr id="39" name="CustomShape 1"/>
           <p:cNvSpPr/>
           <p:nvPr/>
         </p:nvSpPr>
         <p:spPr>
           <a:xfrm>
             <a:off x="3189960" y="4731480"/>
-            <a:ext cx="2474640" cy="302760"/>
+            <a:ext cx="2474280" cy="302400"/>
           </a:xfrm>
           <a:prstGeom prst="rect">
             <a:avLst/>
@@ -3626,7 +3414,7 @@
       </p:sp>
       <p:sp>
         <p:nvSpPr>
-          <p:cNvPr id="41" name="PlaceHolder 2"/>
+          <p:cNvPr id="40" name="PlaceHolder 2"/>
           <p:cNvSpPr>
             <a:spLocks noGrp="1"/>
           </p:cNvSpPr>
@@ -3637,42 +3425,30 @@
         <p:spPr>
           <a:xfrm>
             <a:off x="457200" y="205920"/>
-            <a:ext cx="8229240" cy="856800"/>
-          </a:xfrm>
-          <a:prstGeom prst="rect">
-            <a:avLst/>
-          </a:prstGeom>
-        </p:spPr>
-        <p:txBody>
-          <a:bodyPr lIns="45720" rIns="45720" tIns="45000" bIns="45000" anchor="ctr"/>
-          <a:p>
-            <a:pPr algn="ctr">
-              <a:lnSpc>
-                <a:spcPct val="100000"/>
-              </a:lnSpc>
-            </a:pPr>
+            <a:ext cx="8228880" cy="856440"/>
+          </a:xfrm>
+          <a:prstGeom prst="rect">
+            <a:avLst/>
+          </a:prstGeom>
+        </p:spPr>
+        <p:txBody>
+          <a:bodyPr lIns="0" rIns="0" tIns="0" bIns="0" anchor="ctr"/>
+          <a:p>
             <a:r>
-              <a:rPr b="0" lang="en-US" sz="4400" spc="-1" strike="noStrike">
-                <a:solidFill>
-                  <a:srgbClr val="000000"/>
-                </a:solidFill>
-                <a:latin typeface="Calibri"/>
-                <a:ea typeface="Calibri"/>
+              <a:rPr b="0" lang="en-US" sz="1800" spc="-1" strike="noStrike">
+                <a:latin typeface="Arial"/>
               </a:rPr>
-              <a:t>Title Text</a:t>
+              <a:t>Click to edit the title text format</a:t>
             </a:r>
-            <a:endParaRPr b="0" lang="en-US" sz="4400" spc="-1" strike="noStrike">
-              <a:solidFill>
-                <a:srgbClr val="000000"/>
-              </a:solidFill>
-              <a:latin typeface="Calibri"/>
-            </a:endParaRPr>
-          </a:p>
-        </p:txBody>
-      </p:sp>
-      <p:sp>
-        <p:nvSpPr>
-          <p:cNvPr id="42" name="PlaceHolder 3"/>
+            <a:endParaRPr b="0" lang="en-US" sz="1800" spc="-1" strike="noStrike">
+              <a:latin typeface="Arial"/>
+            </a:endParaRPr>
+          </a:p>
+        </p:txBody>
+      </p:sp>
+      <p:sp>
+        <p:nvSpPr>
+          <p:cNvPr id="41" name="PlaceHolder 3"/>
           <p:cNvSpPr>
             <a:spLocks noGrp="1"/>
           </p:cNvSpPr>
@@ -3683,210 +3459,168 @@
         <p:spPr>
           <a:xfrm>
             <a:off x="457200" y="1200240"/>
-            <a:ext cx="8229240" cy="3394080"/>
-          </a:xfrm>
-          <a:prstGeom prst="rect">
-            <a:avLst/>
-          </a:prstGeom>
-        </p:spPr>
-        <p:txBody>
-          <a:bodyPr lIns="45720" rIns="45720" tIns="45000" bIns="45000"/>
-          <a:p>
-            <a:pPr marL="343080" indent="-342720">
-              <a:lnSpc>
-                <a:spcPct val="100000"/>
-              </a:lnSpc>
+            <a:ext cx="8228880" cy="3393720"/>
+          </a:xfrm>
+          <a:prstGeom prst="rect">
+            <a:avLst/>
+          </a:prstGeom>
+        </p:spPr>
+        <p:txBody>
+          <a:bodyPr lIns="0" rIns="0" tIns="0" bIns="0">
+            <a:normAutofit/>
+          </a:bodyPr>
+          <a:p>
+            <a:pPr marL="432000" indent="-324000">
               <a:spcBef>
-                <a:spcPts val="700"/>
+                <a:spcPts val="1417"/>
               </a:spcBef>
               <a:buClr>
                 <a:srgbClr val="000000"/>
               </a:buClr>
-              <a:buFont typeface="Arial"/>
-              <a:buChar char="•"/>
+              <a:buSzPct val="45000"/>
+              <a:buFont typeface="Wingdings" charset="2"/>
+              <a:buChar char=""/>
             </a:pPr>
             <a:r>
-              <a:rPr b="0" lang="en-US" sz="3200" spc="-1" strike="noStrike">
-                <a:solidFill>
-                  <a:srgbClr val="000000"/>
-                </a:solidFill>
-                <a:latin typeface="Calibri"/>
-                <a:ea typeface="Calibri"/>
+              <a:rPr b="0" lang="en-US" sz="1800" spc="-1" strike="noStrike">
+                <a:latin typeface="Arial"/>
               </a:rPr>
-              <a:t>Body Level One</a:t>
+              <a:t>Click to edit the outline text format</a:t>
             </a:r>
-            <a:endParaRPr b="0" lang="en-US" sz="3200" spc="-1" strike="noStrike">
-              <a:solidFill>
-                <a:srgbClr val="000000"/>
-              </a:solidFill>
-              <a:latin typeface="Calibri"/>
-            </a:endParaRPr>
-          </a:p>
-          <a:p>
-            <a:pPr lvl="1" marL="783720" indent="-326160">
-              <a:lnSpc>
-                <a:spcPct val="100000"/>
-              </a:lnSpc>
+            <a:endParaRPr b="0" lang="en-US" sz="1800" spc="-1" strike="noStrike">
+              <a:latin typeface="Arial"/>
+            </a:endParaRPr>
+          </a:p>
+          <a:p>
+            <a:pPr lvl="1" marL="864000" indent="-324000">
               <a:spcBef>
-                <a:spcPts val="700"/>
+                <a:spcPts val="1134"/>
               </a:spcBef>
               <a:buClr>
                 <a:srgbClr val="000000"/>
               </a:buClr>
-              <a:buFont typeface="Arial"/>
-              <a:buChar char="–"/>
+              <a:buSzPct val="75000"/>
+              <a:buFont typeface="Symbol" charset="2"/>
+              <a:buChar char=""/>
             </a:pPr>
             <a:r>
-              <a:rPr b="0" lang="en-US" sz="3200" spc="-1" strike="noStrike">
-                <a:solidFill>
-                  <a:srgbClr val="000000"/>
-                </a:solidFill>
-                <a:latin typeface="Calibri"/>
-                <a:ea typeface="Calibri"/>
+              <a:rPr b="0" lang="en-US" sz="1800" spc="-1" strike="noStrike">
+                <a:latin typeface="Arial"/>
               </a:rPr>
-              <a:t>Body Level Two</a:t>
+              <a:t>Second Outline Level</a:t>
             </a:r>
-            <a:endParaRPr b="0" lang="en-US" sz="3200" spc="-1" strike="noStrike">
-              <a:solidFill>
-                <a:srgbClr val="000000"/>
-              </a:solidFill>
-              <a:latin typeface="Calibri"/>
-            </a:endParaRPr>
-          </a:p>
-          <a:p>
-            <a:pPr lvl="2" marL="1219320" indent="-304560">
-              <a:lnSpc>
-                <a:spcPct val="100000"/>
-              </a:lnSpc>
+            <a:endParaRPr b="0" lang="en-US" sz="1800" spc="-1" strike="noStrike">
+              <a:latin typeface="Arial"/>
+            </a:endParaRPr>
+          </a:p>
+          <a:p>
+            <a:pPr lvl="2" marL="1296000" indent="-288000">
               <a:spcBef>
-                <a:spcPts val="700"/>
+                <a:spcPts val="850"/>
               </a:spcBef>
               <a:buClr>
                 <a:srgbClr val="000000"/>
               </a:buClr>
-              <a:buFont typeface="Arial"/>
-              <a:buChar char="•"/>
+              <a:buSzPct val="45000"/>
+              <a:buFont typeface="Wingdings" charset="2"/>
+              <a:buChar char=""/>
             </a:pPr>
             <a:r>
-              <a:rPr b="0" lang="en-US" sz="3200" spc="-1" strike="noStrike">
-                <a:solidFill>
-                  <a:srgbClr val="000000"/>
-                </a:solidFill>
-                <a:latin typeface="Calibri"/>
-                <a:ea typeface="Calibri"/>
+              <a:rPr b="0" lang="en-US" sz="1800" spc="-1" strike="noStrike">
+                <a:latin typeface="Arial"/>
               </a:rPr>
-              <a:t>Body Level Three</a:t>
+              <a:t>Third Outline Level</a:t>
             </a:r>
-            <a:endParaRPr b="0" lang="en-US" sz="3200" spc="-1" strike="noStrike">
-              <a:solidFill>
-                <a:srgbClr val="000000"/>
-              </a:solidFill>
-              <a:latin typeface="Calibri"/>
-            </a:endParaRPr>
-          </a:p>
-          <a:p>
-            <a:pPr lvl="3" marL="1737360" indent="-365400">
-              <a:lnSpc>
-                <a:spcPct val="100000"/>
-              </a:lnSpc>
+            <a:endParaRPr b="0" lang="en-US" sz="1800" spc="-1" strike="noStrike">
+              <a:latin typeface="Arial"/>
+            </a:endParaRPr>
+          </a:p>
+          <a:p>
+            <a:pPr lvl="3" marL="1728000" indent="-216000">
               <a:spcBef>
-                <a:spcPts val="700"/>
+                <a:spcPts val="567"/>
               </a:spcBef>
               <a:buClr>
                 <a:srgbClr val="000000"/>
               </a:buClr>
-              <a:buFont typeface="Arial"/>
-              <a:buChar char="–"/>
+              <a:buSzPct val="75000"/>
+              <a:buFont typeface="Symbol" charset="2"/>
+              <a:buChar char=""/>
             </a:pPr>
             <a:r>
-              <a:rPr b="0" lang="en-US" sz="3200" spc="-1" strike="noStrike">
-                <a:solidFill>
-                  <a:srgbClr val="000000"/>
-                </a:solidFill>
-                <a:latin typeface="Calibri"/>
-                <a:ea typeface="Calibri"/>
+              <a:rPr b="0" lang="en-US" sz="1800" spc="-1" strike="noStrike">
+                <a:latin typeface="Arial"/>
               </a:rPr>
-              <a:t>Body Level Four</a:t>
+              <a:t>Fourth Outline Level</a:t>
             </a:r>
-            <a:endParaRPr b="0" lang="en-US" sz="3200" spc="-1" strike="noStrike">
-              <a:solidFill>
-                <a:srgbClr val="000000"/>
-              </a:solidFill>
-              <a:latin typeface="Calibri"/>
-            </a:endParaRPr>
-          </a:p>
-          <a:p>
-            <a:pPr lvl="4" marL="2194560" indent="-365400">
-              <a:lnSpc>
-                <a:spcPct val="100000"/>
-              </a:lnSpc>
+            <a:endParaRPr b="0" lang="en-US" sz="1800" spc="-1" strike="noStrike">
+              <a:latin typeface="Arial"/>
+            </a:endParaRPr>
+          </a:p>
+          <a:p>
+            <a:pPr lvl="4" marL="2160000" indent="-216000">
               <a:spcBef>
-                <a:spcPts val="700"/>
+                <a:spcPts val="283"/>
               </a:spcBef>
               <a:buClr>
                 <a:srgbClr val="000000"/>
               </a:buClr>
-              <a:buFont typeface="Arial"/>
-              <a:buChar char="»"/>
+              <a:buSzPct val="45000"/>
+              <a:buFont typeface="Wingdings" charset="2"/>
+              <a:buChar char=""/>
             </a:pPr>
             <a:r>
-              <a:rPr b="0" lang="en-US" sz="3200" spc="-1" strike="noStrike">
-                <a:solidFill>
-                  <a:srgbClr val="000000"/>
-                </a:solidFill>
-                <a:latin typeface="Calibri"/>
-                <a:ea typeface="Calibri"/>
+              <a:rPr b="0" lang="en-US" sz="1800" spc="-1" strike="noStrike">
+                <a:latin typeface="Arial"/>
               </a:rPr>
-              <a:t>Body Level Five</a:t>
+              <a:t>Fifth Outline Level</a:t>
             </a:r>
-            <a:endParaRPr b="0" lang="en-US" sz="3200" spc="-1" strike="noStrike">
-              <a:solidFill>
+            <a:endParaRPr b="0" lang="en-US" sz="1800" spc="-1" strike="noStrike">
+              <a:latin typeface="Arial"/>
+            </a:endParaRPr>
+          </a:p>
+          <a:p>
+            <a:pPr lvl="5" marL="2592000" indent="-216000">
+              <a:spcBef>
+                <a:spcPts val="283"/>
+              </a:spcBef>
+              <a:buClr>
                 <a:srgbClr val="000000"/>
-              </a:solidFill>
-              <a:latin typeface="Calibri"/>
-            </a:endParaRPr>
-          </a:p>
-        </p:txBody>
-      </p:sp>
-      <p:sp>
-        <p:nvSpPr>
-          <p:cNvPr id="43" name="PlaceHolder 4"/>
-          <p:cNvSpPr>
-            <a:spLocks noGrp="1"/>
-          </p:cNvSpPr>
-          <p:nvPr>
-            <p:ph type="sldNum"/>
-          </p:nvPr>
-        </p:nvSpPr>
-        <p:spPr>
-          <a:xfrm>
-            <a:off x="8422920" y="4769640"/>
-            <a:ext cx="263520" cy="268920"/>
-          </a:xfrm>
-          <a:prstGeom prst="rect">
-            <a:avLst/>
-          </a:prstGeom>
-        </p:spPr>
-        <p:txBody>
-          <a:bodyPr lIns="45720" rIns="45720" tIns="45000" bIns="45000" anchor="ctr"/>
-          <a:p>
-            <a:pPr algn="r">
-              <a:lnSpc>
-                <a:spcPct val="100000"/>
-              </a:lnSpc>
+              </a:buClr>
+              <a:buSzPct val="45000"/>
+              <a:buFont typeface="Wingdings" charset="2"/>
+              <a:buChar char=""/>
             </a:pPr>
-            <a:fld id="{0B61A0D9-0B72-4215-802D-30E6F6DFDBCF}" type="slidenum">
-              <a:rPr b="0" lang="en-US" sz="1200" spc="-1" strike="noStrike">
-                <a:solidFill>
-                  <a:srgbClr val="888888"/>
-                </a:solidFill>
-                <a:latin typeface="Calibri"/>
-                <a:ea typeface="Calibri"/>
+            <a:r>
+              <a:rPr b="0" lang="en-US" sz="1800" spc="-1" strike="noStrike">
+                <a:latin typeface="Arial"/>
               </a:rPr>
-              <a:t>1</a:t>
-            </a:fld>
-            <a:endParaRPr b="0" lang="en-US" sz="1200" spc="-1" strike="noStrike">
-              <a:latin typeface="Times New Roman"/>
+              <a:t>Sixth Outline Level</a:t>
+            </a:r>
+            <a:endParaRPr b="0" lang="en-US" sz="1800" spc="-1" strike="noStrike">
+              <a:latin typeface="Arial"/>
+            </a:endParaRPr>
+          </a:p>
+          <a:p>
+            <a:pPr lvl="6" marL="3024000" indent="-216000">
+              <a:spcBef>
+                <a:spcPts val="283"/>
+              </a:spcBef>
+              <a:buClr>
+                <a:srgbClr val="000000"/>
+              </a:buClr>
+              <a:buSzPct val="45000"/>
+              <a:buFont typeface="Wingdings" charset="2"/>
+              <a:buChar char=""/>
+            </a:pPr>
+            <a:r>
+              <a:rPr b="0" lang="en-US" sz="1800" spc="-1" strike="noStrike">
+                <a:latin typeface="Arial"/>
+              </a:rPr>
+              <a:t>Seventh Outline Level</a:t>
+            </a:r>
+            <a:endParaRPr b="0" lang="en-US" sz="1800" spc="-1" strike="noStrike">
+              <a:latin typeface="Arial"/>
             </a:endParaRPr>
           </a:p>
         </p:txBody>
@@ -3930,14 +3664,14 @@
       </p:grpSpPr>
       <p:sp>
         <p:nvSpPr>
-          <p:cNvPr id="86" name="TextShape 1"/>
-          <p:cNvSpPr txBox="1"/>
+          <p:cNvPr id="84" name="CustomShape 1"/>
+          <p:cNvSpPr/>
           <p:nvPr/>
         </p:nvSpPr>
         <p:spPr>
           <a:xfrm>
             <a:off x="330840" y="465840"/>
-            <a:ext cx="4452840" cy="1678320"/>
+            <a:ext cx="4452480" cy="1677960"/>
           </a:xfrm>
           <a:prstGeom prst="rect">
             <a:avLst/>
@@ -3947,6 +3681,12 @@
             <a:noFill/>
           </a:ln>
         </p:spPr>
+        <p:style>
+          <a:lnRef idx="0"/>
+          <a:fillRef idx="0"/>
+          <a:effectRef idx="0"/>
+          <a:fontRef idx="minor"/>
+        </p:style>
         <p:txBody>
           <a:bodyPr lIns="45720" rIns="45720" tIns="45000" bIns="45000" anchor="ctr">
             <a:normAutofit/>
@@ -3979,24 +3719,21 @@
               <a:t>DSCP LE</a:t>
             </a:r>
             <a:endParaRPr b="0" lang="en-US" sz="4400" spc="-1" strike="noStrike">
-              <a:solidFill>
-                <a:srgbClr val="000000"/>
-              </a:solidFill>
-              <a:latin typeface="Calibri"/>
-            </a:endParaRPr>
-          </a:p>
-        </p:txBody>
-      </p:sp>
-      <p:sp>
-        <p:nvSpPr>
-          <p:cNvPr id="87" name="TextShape 2"/>
-          <p:cNvSpPr txBox="1"/>
+              <a:latin typeface="Arial"/>
+            </a:endParaRPr>
+          </a:p>
+        </p:txBody>
+      </p:sp>
+      <p:sp>
+        <p:nvSpPr>
+          <p:cNvPr id="85" name="CustomShape 2"/>
+          <p:cNvSpPr/>
           <p:nvPr/>
         </p:nvSpPr>
         <p:spPr>
           <a:xfrm>
             <a:off x="330840" y="2928240"/>
-            <a:ext cx="4452840" cy="1685520"/>
+            <a:ext cx="4452480" cy="1685160"/>
           </a:xfrm>
           <a:prstGeom prst="rect">
             <a:avLst/>
@@ -4006,12 +3743,18 @@
             <a:noFill/>
           </a:ln>
         </p:spPr>
+        <p:style>
+          <a:lnRef idx="0"/>
+          <a:fillRef idx="0"/>
+          <a:effectRef idx="0"/>
+          <a:fontRef idx="minor"/>
+        </p:style>
         <p:txBody>
           <a:bodyPr lIns="45720" rIns="45720" tIns="45000" bIns="45000">
             <a:normAutofit/>
           </a:bodyPr>
           <a:p>
-            <a:pPr marL="343080" indent="-342720">
+            <a:pPr marL="343080" indent="-342360">
               <a:lnSpc>
                 <a:spcPct val="100000"/>
               </a:lnSpc>
@@ -4039,7 +3782,7 @@
             </a:endParaRPr>
           </a:p>
           <a:p>
-            <a:pPr marL="343080" indent="-342720">
+            <a:pPr marL="343080" indent="-342360">
               <a:lnSpc>
                 <a:spcPct val="100000"/>
               </a:lnSpc>
@@ -4067,7 +3810,7 @@
             </a:endParaRPr>
           </a:p>
           <a:p>
-            <a:pPr marL="343080" indent="-342720">
+            <a:pPr marL="343080" indent="-342360">
               <a:lnSpc>
                 <a:spcPct val="100000"/>
               </a:lnSpc>
@@ -4098,7 +3841,7 @@
       </p:sp>
       <p:pic>
         <p:nvPicPr>
-          <p:cNvPr id="88" name="Picture 4" descr=""/>
+          <p:cNvPr id="86" name="Picture 4" descr=""/>
           <p:cNvPicPr/>
           <p:nvPr/>
         </p:nvPicPr>
@@ -4109,7 +3852,7 @@
         <p:spPr>
           <a:xfrm>
             <a:off x="4922640" y="1711080"/>
-            <a:ext cx="3725280" cy="2433960"/>
+            <a:ext cx="3724920" cy="2433600"/>
           </a:xfrm>
           <a:prstGeom prst="rect">
             <a:avLst/>
@@ -4121,7 +3864,7 @@
       </p:pic>
       <p:pic>
         <p:nvPicPr>
-          <p:cNvPr id="89" name="" descr=""/>
+          <p:cNvPr id="87" name="" descr=""/>
           <p:cNvPicPr/>
           <p:nvPr/>
         </p:nvPicPr>
@@ -4132,7 +3875,7 @@
         <p:spPr>
           <a:xfrm>
             <a:off x="6022440" y="146880"/>
-            <a:ext cx="1749960" cy="1133280"/>
+            <a:ext cx="1749600" cy="1132920"/>
           </a:xfrm>
           <a:prstGeom prst="rect">
             <a:avLst/>
@@ -4193,14 +3936,14 @@
       </p:grpSpPr>
       <p:sp>
         <p:nvSpPr>
-          <p:cNvPr id="90" name="TextShape 1"/>
-          <p:cNvSpPr txBox="1"/>
+          <p:cNvPr id="88" name="CustomShape 1"/>
+          <p:cNvSpPr/>
           <p:nvPr/>
         </p:nvSpPr>
         <p:spPr>
           <a:xfrm>
             <a:off x="457200" y="205920"/>
-            <a:ext cx="8229240" cy="856800"/>
+            <a:ext cx="8228880" cy="856440"/>
           </a:xfrm>
           <a:prstGeom prst="rect">
             <a:avLst/>
@@ -4210,6 +3953,12 @@
             <a:noFill/>
           </a:ln>
         </p:spPr>
+        <p:style>
+          <a:lnRef idx="0"/>
+          <a:fillRef idx="0"/>
+          <a:effectRef idx="0"/>
+          <a:fontRef idx="minor"/>
+        </p:style>
         <p:txBody>
           <a:bodyPr lIns="45720" rIns="45720" tIns="45000" bIns="45000" anchor="ctr"/>
           <a:p>
@@ -4229,24 +3978,21 @@
               <a:t>Hackathon Plan</a:t>
             </a:r>
             <a:endParaRPr b="0" lang="en-US" sz="4400" spc="-1" strike="noStrike">
-              <a:solidFill>
-                <a:srgbClr val="000000"/>
-              </a:solidFill>
-              <a:latin typeface="Calibri"/>
-            </a:endParaRPr>
-          </a:p>
-        </p:txBody>
-      </p:sp>
-      <p:sp>
-        <p:nvSpPr>
-          <p:cNvPr id="91" name="TextShape 2"/>
-          <p:cNvSpPr txBox="1"/>
+              <a:latin typeface="Arial"/>
+            </a:endParaRPr>
+          </a:p>
+        </p:txBody>
+      </p:sp>
+      <p:sp>
+        <p:nvSpPr>
+          <p:cNvPr id="89" name="CustomShape 2"/>
+          <p:cNvSpPr/>
           <p:nvPr/>
         </p:nvSpPr>
         <p:spPr>
           <a:xfrm>
             <a:off x="546120" y="1454040"/>
-            <a:ext cx="5888520" cy="3566880"/>
+            <a:ext cx="5888160" cy="3566520"/>
           </a:xfrm>
           <a:prstGeom prst="rect">
             <a:avLst/>
@@ -4256,10 +4002,16 @@
             <a:noFill/>
           </a:ln>
         </p:spPr>
+        <p:style>
+          <a:lnRef idx="0"/>
+          <a:fillRef idx="0"/>
+          <a:effectRef idx="0"/>
+          <a:fontRef idx="minor"/>
+        </p:style>
         <p:txBody>
           <a:bodyPr lIns="45720" rIns="45720" tIns="45000" bIns="45000"/>
           <a:p>
-            <a:pPr marL="228600" indent="-228240">
+            <a:pPr marL="228600" indent="-227880">
               <a:lnSpc>
                 <a:spcPct val="90000"/>
               </a:lnSpc>
@@ -4283,22 +4035,21 @@
               <a:t>Implement the new codepoint for DSCP: draft-ietf-tsvwg-le-phb-10</a:t>
             </a:r>
             <a:endParaRPr b="0" lang="en-US" sz="2400" spc="-1" strike="noStrike">
-              <a:solidFill>
-                <a:srgbClr val="000000"/>
-              </a:solidFill>
-              <a:latin typeface="Calibri"/>
-            </a:endParaRPr>
-          </a:p>
-          <a:p>
+              <a:latin typeface="Arial"/>
+            </a:endParaRPr>
+          </a:p>
+          <a:p>
+            <a:pPr>
+              <a:lnSpc>
+                <a:spcPct val="100000"/>
+              </a:lnSpc>
+            </a:pPr>
             <a:endParaRPr b="0" lang="en-US" sz="2400" spc="-1" strike="noStrike">
-              <a:solidFill>
-                <a:srgbClr val="000000"/>
-              </a:solidFill>
-              <a:latin typeface="Calibri"/>
-            </a:endParaRPr>
-          </a:p>
-          <a:p>
-            <a:pPr marL="228600" indent="-228240">
+              <a:latin typeface="Arial"/>
+            </a:endParaRPr>
+          </a:p>
+          <a:p>
+            <a:pPr marL="228600" indent="-227880">
               <a:lnSpc>
                 <a:spcPct val="90000"/>
               </a:lnSpc>
@@ -4322,24 +4073,21 @@
               <a:t>Working from Mauritius</a:t>
             </a:r>
             <a:endParaRPr b="0" lang="en-US" sz="2400" spc="-1" strike="noStrike">
-              <a:solidFill>
-                <a:srgbClr val="000000"/>
-              </a:solidFill>
-              <a:latin typeface="Calibri"/>
-            </a:endParaRPr>
-          </a:p>
-        </p:txBody>
-      </p:sp>
-      <p:sp>
-        <p:nvSpPr>
-          <p:cNvPr id="92" name="TextShape 3"/>
-          <p:cNvSpPr txBox="1"/>
+              <a:latin typeface="Arial"/>
+            </a:endParaRPr>
+          </a:p>
+        </p:txBody>
+      </p:sp>
+      <p:sp>
+        <p:nvSpPr>
+          <p:cNvPr id="90" name="CustomShape 3"/>
+          <p:cNvSpPr/>
           <p:nvPr/>
         </p:nvSpPr>
         <p:spPr>
           <a:xfrm>
             <a:off x="8502840" y="4769640"/>
-            <a:ext cx="183600" cy="268920"/>
+            <a:ext cx="183240" cy="268560"/>
           </a:xfrm>
           <a:prstGeom prst="rect">
             <a:avLst/>
@@ -4349,6 +4097,12 @@
             <a:noFill/>
           </a:ln>
         </p:spPr>
+        <p:style>
+          <a:lnRef idx="0"/>
+          <a:fillRef idx="0"/>
+          <a:effectRef idx="0"/>
+          <a:fontRef idx="minor"/>
+        </p:style>
         <p:txBody>
           <a:bodyPr lIns="45720" rIns="45720" tIns="45000" bIns="45000" anchor="ctr"/>
           <a:p>
@@ -4357,7 +4111,7 @@
                 <a:spcPct val="100000"/>
               </a:lnSpc>
             </a:pPr>
-            <a:fld id="{55154D75-8715-403D-9B98-B9E1182C55C2}" type="slidenum">
+            <a:fld id="{B0DF5140-AF77-4DF7-A8D8-D8CAD62054C7}" type="slidenum">
               <a:rPr b="0" lang="en-US" sz="1200" spc="-1" strike="noStrike">
                 <a:solidFill>
                   <a:srgbClr val="888888"/>
@@ -4365,10 +4119,10 @@
                 <a:latin typeface="Calibri"/>
                 <a:ea typeface="Calibri"/>
               </a:rPr>
-              <a:t>1</a:t>
+              <a:t>&lt;number&gt;</a:t>
             </a:fld>
             <a:endParaRPr b="0" lang="en-US" sz="1200" spc="-1" strike="noStrike">
-              <a:latin typeface="Times New Roman"/>
+              <a:latin typeface="Arial"/>
             </a:endParaRPr>
           </a:p>
         </p:txBody>
@@ -4424,14 +4178,14 @@
       </p:grpSpPr>
       <p:sp>
         <p:nvSpPr>
-          <p:cNvPr id="93" name="TextShape 1"/>
-          <p:cNvSpPr txBox="1"/>
+          <p:cNvPr id="91" name="CustomShape 1"/>
+          <p:cNvSpPr/>
           <p:nvPr/>
         </p:nvSpPr>
         <p:spPr>
           <a:xfrm>
             <a:off x="457200" y="205920"/>
-            <a:ext cx="8229240" cy="856800"/>
+            <a:ext cx="8228880" cy="856440"/>
           </a:xfrm>
           <a:prstGeom prst="rect">
             <a:avLst/>
@@ -4441,6 +4195,12 @@
             <a:noFill/>
           </a:ln>
         </p:spPr>
+        <p:style>
+          <a:lnRef idx="0"/>
+          <a:fillRef idx="0"/>
+          <a:effectRef idx="0"/>
+          <a:fontRef idx="minor"/>
+        </p:style>
         <p:txBody>
           <a:bodyPr lIns="45720" rIns="45720" tIns="45000" bIns="45000" anchor="ctr"/>
           <a:p>
@@ -4460,24 +4220,21 @@
               <a:t>What got done</a:t>
             </a:r>
             <a:endParaRPr b="0" lang="en-US" sz="4400" spc="-1" strike="noStrike">
-              <a:solidFill>
-                <a:srgbClr val="000000"/>
-              </a:solidFill>
-              <a:latin typeface="Calibri"/>
-            </a:endParaRPr>
-          </a:p>
-        </p:txBody>
-      </p:sp>
-      <p:sp>
-        <p:nvSpPr>
-          <p:cNvPr id="94" name="TextShape 2"/>
-          <p:cNvSpPr txBox="1"/>
+              <a:latin typeface="Arial"/>
+            </a:endParaRPr>
+          </a:p>
+        </p:txBody>
+      </p:sp>
+      <p:sp>
+        <p:nvSpPr>
+          <p:cNvPr id="92" name="CustomShape 2"/>
+          <p:cNvSpPr/>
           <p:nvPr/>
         </p:nvSpPr>
         <p:spPr>
           <a:xfrm>
             <a:off x="457200" y="1200240"/>
-            <a:ext cx="7940160" cy="3566880"/>
+            <a:ext cx="7939800" cy="3566520"/>
           </a:xfrm>
           <a:prstGeom prst="rect">
             <a:avLst/>
@@ -4487,10 +4244,16 @@
             <a:noFill/>
           </a:ln>
         </p:spPr>
+        <p:style>
+          <a:lnRef idx="0"/>
+          <a:fillRef idx="0"/>
+          <a:effectRef idx="0"/>
+          <a:fontRef idx="minor"/>
+        </p:style>
         <p:txBody>
           <a:bodyPr lIns="45720" rIns="45720" tIns="45000" bIns="45000"/>
           <a:p>
-            <a:pPr marL="189360" indent="-189000">
+            <a:pPr marL="189360" indent="-188640">
               <a:lnSpc>
                 <a:spcPct val="90000"/>
               </a:lnSpc>
@@ -4514,14 +4277,11 @@
               <a:t>OpenSSH Pull request</a:t>
             </a:r>
             <a:endParaRPr b="0" lang="en-US" sz="2400" spc="-1" strike="noStrike">
-              <a:solidFill>
-                <a:srgbClr val="000000"/>
-              </a:solidFill>
-              <a:latin typeface="Calibri"/>
-            </a:endParaRPr>
-          </a:p>
-          <a:p>
-            <a:pPr lvl="1" marL="646560" indent="-189000">
+              <a:latin typeface="Arial"/>
+            </a:endParaRPr>
+          </a:p>
+          <a:p>
+            <a:pPr lvl="1" marL="646560" indent="-188640">
               <a:lnSpc>
                 <a:spcPct val="90000"/>
               </a:lnSpc>
@@ -4545,45 +4305,34 @@
               <a:t>Netperf Pull request</a:t>
             </a:r>
             <a:endParaRPr b="0" lang="en-US" sz="2400" spc="-1" strike="noStrike">
-              <a:solidFill>
-                <a:srgbClr val="000000"/>
-              </a:solidFill>
-              <a:latin typeface="Calibri"/>
-            </a:endParaRPr>
-          </a:p>
-          <a:p>
-            <a:pPr lvl="1" marL="646560" indent="-189000">
+              <a:latin typeface="Arial"/>
+            </a:endParaRPr>
+          </a:p>
+          <a:p>
+            <a:pPr>
               <a:lnSpc>
                 <a:spcPct val="90000"/>
               </a:lnSpc>
               <a:spcBef>
                 <a:spcPts val="1500"/>
               </a:spcBef>
-              <a:buClr>
-                <a:srgbClr val="000000"/>
-              </a:buClr>
-              <a:buFont typeface="Arial"/>
-              <a:buChar char="•"/>
             </a:pPr>
             <a:endParaRPr b="0" lang="en-US" sz="2400" spc="-1" strike="noStrike">
-              <a:solidFill>
-                <a:srgbClr val="000000"/>
-              </a:solidFill>
-              <a:latin typeface="Calibri"/>
-            </a:endParaRPr>
-          </a:p>
-        </p:txBody>
-      </p:sp>
-      <p:sp>
-        <p:nvSpPr>
-          <p:cNvPr id="95" name="TextShape 3"/>
-          <p:cNvSpPr txBox="1"/>
+              <a:latin typeface="Arial"/>
+            </a:endParaRPr>
+          </a:p>
+        </p:txBody>
+      </p:sp>
+      <p:sp>
+        <p:nvSpPr>
+          <p:cNvPr id="93" name="CustomShape 3"/>
+          <p:cNvSpPr/>
           <p:nvPr/>
         </p:nvSpPr>
         <p:spPr>
           <a:xfrm>
             <a:off x="8502840" y="4769640"/>
-            <a:ext cx="183600" cy="268920"/>
+            <a:ext cx="183240" cy="268560"/>
           </a:xfrm>
           <a:prstGeom prst="rect">
             <a:avLst/>
@@ -4593,6 +4342,12 @@
             <a:noFill/>
           </a:ln>
         </p:spPr>
+        <p:style>
+          <a:lnRef idx="0"/>
+          <a:fillRef idx="0"/>
+          <a:effectRef idx="0"/>
+          <a:fontRef idx="minor"/>
+        </p:style>
         <p:txBody>
           <a:bodyPr lIns="45720" rIns="45720" tIns="45000" bIns="45000" anchor="ctr"/>
           <a:p>
@@ -4601,7 +4356,7 @@
                 <a:spcPct val="100000"/>
               </a:lnSpc>
             </a:pPr>
-            <a:fld id="{435FFF4C-13E7-43EE-9AEB-4E0D17586B20}" type="slidenum">
+            <a:fld id="{2067A255-335C-4C98-9445-AD3179C4EC52}" type="slidenum">
               <a:rPr b="0" lang="en-US" sz="1200" spc="-1" strike="noStrike">
                 <a:solidFill>
                   <a:srgbClr val="888888"/>
@@ -4609,10 +4364,10 @@
                 <a:latin typeface="Calibri"/>
                 <a:ea typeface="Calibri"/>
               </a:rPr>
-              <a:t>1</a:t>
+              <a:t>&lt;number&gt;</a:t>
             </a:fld>
             <a:endParaRPr b="0" lang="en-US" sz="1200" spc="-1" strike="noStrike">
-              <a:latin typeface="Times New Roman"/>
+              <a:latin typeface="Arial"/>
             </a:endParaRPr>
           </a:p>
         </p:txBody>
@@ -4668,14 +4423,14 @@
       </p:grpSpPr>
       <p:sp>
         <p:nvSpPr>
-          <p:cNvPr id="96" name="TextShape 1"/>
-          <p:cNvSpPr txBox="1"/>
+          <p:cNvPr id="94" name="CustomShape 1"/>
+          <p:cNvSpPr/>
           <p:nvPr/>
         </p:nvSpPr>
         <p:spPr>
           <a:xfrm>
             <a:off x="457200" y="205920"/>
-            <a:ext cx="8229240" cy="856800"/>
+            <a:ext cx="8228880" cy="856440"/>
           </a:xfrm>
           <a:prstGeom prst="rect">
             <a:avLst/>
@@ -4685,6 +4440,12 @@
             <a:noFill/>
           </a:ln>
         </p:spPr>
+        <p:style>
+          <a:lnRef idx="0"/>
+          <a:fillRef idx="0"/>
+          <a:effectRef idx="0"/>
+          <a:fontRef idx="minor"/>
+        </p:style>
         <p:txBody>
           <a:bodyPr lIns="45720" rIns="45720" tIns="45000" bIns="45000" anchor="ctr"/>
           <a:p>
@@ -4704,24 +4465,21 @@
               <a:t>What we learned</a:t>
             </a:r>
             <a:endParaRPr b="0" lang="en-US" sz="4400" spc="-1" strike="noStrike">
-              <a:solidFill>
-                <a:srgbClr val="000000"/>
-              </a:solidFill>
-              <a:latin typeface="Calibri"/>
-            </a:endParaRPr>
-          </a:p>
-        </p:txBody>
-      </p:sp>
-      <p:sp>
-        <p:nvSpPr>
-          <p:cNvPr id="97" name="TextShape 2"/>
-          <p:cNvSpPr txBox="1"/>
+              <a:latin typeface="Arial"/>
+            </a:endParaRPr>
+          </a:p>
+        </p:txBody>
+      </p:sp>
+      <p:sp>
+        <p:nvSpPr>
+          <p:cNvPr id="95" name="CustomShape 2"/>
+          <p:cNvSpPr/>
           <p:nvPr/>
         </p:nvSpPr>
         <p:spPr>
           <a:xfrm>
             <a:off x="520560" y="1530360"/>
-            <a:ext cx="7242480" cy="3052080"/>
+            <a:ext cx="7242120" cy="3051720"/>
           </a:xfrm>
           <a:prstGeom prst="rect">
             <a:avLst/>
@@ -4731,10 +4489,16 @@
             <a:noFill/>
           </a:ln>
         </p:spPr>
+        <p:style>
+          <a:lnRef idx="0"/>
+          <a:fillRef idx="0"/>
+          <a:effectRef idx="0"/>
+          <a:fontRef idx="minor"/>
+        </p:style>
         <p:txBody>
           <a:bodyPr lIns="45720" rIns="45720" tIns="45000" bIns="45000"/>
           <a:p>
-            <a:pPr marL="228600" indent="-228240">
+            <a:pPr marL="228600" indent="-227880">
               <a:lnSpc>
                 <a:spcPct val="90000"/>
               </a:lnSpc>
@@ -4758,14 +4522,11 @@
               <a:t>Virtualization NAT mode</a:t>
             </a:r>
             <a:endParaRPr b="0" lang="en-US" sz="2400" spc="-1" strike="noStrike">
-              <a:solidFill>
-                <a:srgbClr val="000000"/>
-              </a:solidFill>
-              <a:latin typeface="Calibri"/>
-            </a:endParaRPr>
-          </a:p>
-          <a:p>
-            <a:pPr lvl="1" marL="685800" indent="-228240">
+              <a:latin typeface="Arial"/>
+            </a:endParaRPr>
+          </a:p>
+          <a:p>
+            <a:pPr lvl="1" marL="685800" indent="-227880">
               <a:lnSpc>
                 <a:spcPct val="90000"/>
               </a:lnSpc>
@@ -4789,14 +4550,11 @@
               <a:t>Driving some of us crazy.</a:t>
             </a:r>
             <a:endParaRPr b="0" lang="en-US" sz="2400" spc="-1" strike="noStrike">
-              <a:solidFill>
-                <a:srgbClr val="000000"/>
-              </a:solidFill>
-              <a:latin typeface="Calibri"/>
-            </a:endParaRPr>
-          </a:p>
-          <a:p>
-            <a:pPr lvl="1" marL="685800" indent="-228240">
+              <a:latin typeface="Arial"/>
+            </a:endParaRPr>
+          </a:p>
+          <a:p>
+            <a:pPr lvl="1" marL="685800" indent="-227880">
               <a:lnSpc>
                 <a:spcPct val="90000"/>
               </a:lnSpc>
@@ -4820,24 +4578,21 @@
               <a:t>New codepoint implies changes across a whole chain.</a:t>
             </a:r>
             <a:endParaRPr b="0" lang="en-US" sz="2400" spc="-1" strike="noStrike">
-              <a:solidFill>
-                <a:srgbClr val="000000"/>
-              </a:solidFill>
-              <a:latin typeface="Calibri"/>
-            </a:endParaRPr>
-          </a:p>
-        </p:txBody>
-      </p:sp>
-      <p:sp>
-        <p:nvSpPr>
-          <p:cNvPr id="98" name="TextShape 3"/>
-          <p:cNvSpPr txBox="1"/>
+              <a:latin typeface="Arial"/>
+            </a:endParaRPr>
+          </a:p>
+        </p:txBody>
+      </p:sp>
+      <p:sp>
+        <p:nvSpPr>
+          <p:cNvPr id="96" name="CustomShape 3"/>
+          <p:cNvSpPr/>
           <p:nvPr/>
         </p:nvSpPr>
         <p:spPr>
           <a:xfrm>
             <a:off x="8502840" y="4769640"/>
-            <a:ext cx="183600" cy="268920"/>
+            <a:ext cx="183240" cy="268560"/>
           </a:xfrm>
           <a:prstGeom prst="rect">
             <a:avLst/>
@@ -4847,6 +4602,12 @@
             <a:noFill/>
           </a:ln>
         </p:spPr>
+        <p:style>
+          <a:lnRef idx="0"/>
+          <a:fillRef idx="0"/>
+          <a:effectRef idx="0"/>
+          <a:fontRef idx="minor"/>
+        </p:style>
         <p:txBody>
           <a:bodyPr lIns="45720" rIns="45720" tIns="45000" bIns="45000" anchor="ctr"/>
           <a:p>
@@ -4855,7 +4616,7 @@
                 <a:spcPct val="100000"/>
               </a:lnSpc>
             </a:pPr>
-            <a:fld id="{4EA758CD-099A-49FE-A311-791ECDAF834A}" type="slidenum">
+            <a:fld id="{F9D847E5-A403-43E0-9C63-E52C157F3632}" type="slidenum">
               <a:rPr b="0" lang="en-US" sz="1200" spc="-1" strike="noStrike">
                 <a:solidFill>
                   <a:srgbClr val="888888"/>
@@ -4863,10 +4624,10 @@
                 <a:latin typeface="Calibri"/>
                 <a:ea typeface="Calibri"/>
               </a:rPr>
-              <a:t>1</a:t>
+              <a:t>&lt;number&gt;</a:t>
             </a:fld>
             <a:endParaRPr b="0" lang="en-US" sz="1200" spc="-1" strike="noStrike">
-              <a:latin typeface="Times New Roman"/>
+              <a:latin typeface="Arial"/>
             </a:endParaRPr>
           </a:p>
         </p:txBody>
@@ -4922,14 +4683,14 @@
       </p:grpSpPr>
       <p:sp>
         <p:nvSpPr>
-          <p:cNvPr id="99" name="TextShape 1"/>
-          <p:cNvSpPr txBox="1"/>
+          <p:cNvPr id="97" name="CustomShape 1"/>
+          <p:cNvSpPr/>
           <p:nvPr/>
         </p:nvSpPr>
         <p:spPr>
           <a:xfrm>
             <a:off x="457200" y="205920"/>
-            <a:ext cx="8229240" cy="856800"/>
+            <a:ext cx="8228880" cy="856440"/>
           </a:xfrm>
           <a:prstGeom prst="rect">
             <a:avLst/>
@@ -4939,6 +4700,12 @@
             <a:noFill/>
           </a:ln>
         </p:spPr>
+        <p:style>
+          <a:lnRef idx="0"/>
+          <a:fillRef idx="0"/>
+          <a:effectRef idx="0"/>
+          <a:fontRef idx="minor"/>
+        </p:style>
         <p:txBody>
           <a:bodyPr lIns="45720" rIns="45720" tIns="45000" bIns="45000" anchor="ctr"/>
           <a:p>
@@ -4958,24 +4725,21 @@
               <a:t>Wrap Up</a:t>
             </a:r>
             <a:endParaRPr b="0" lang="en-US" sz="4400" spc="-1" strike="noStrike">
-              <a:solidFill>
-                <a:srgbClr val="000000"/>
-              </a:solidFill>
-              <a:latin typeface="Calibri"/>
-            </a:endParaRPr>
-          </a:p>
-        </p:txBody>
-      </p:sp>
-      <p:sp>
-        <p:nvSpPr>
-          <p:cNvPr id="100" name="TextShape 2"/>
-          <p:cNvSpPr txBox="1"/>
+              <a:latin typeface="Arial"/>
+            </a:endParaRPr>
+          </a:p>
+        </p:txBody>
+      </p:sp>
+      <p:sp>
+        <p:nvSpPr>
+          <p:cNvPr id="98" name="CustomShape 2"/>
+          <p:cNvSpPr/>
           <p:nvPr/>
         </p:nvSpPr>
         <p:spPr>
           <a:xfrm>
             <a:off x="457200" y="1200240"/>
-            <a:ext cx="4351680" cy="3566880"/>
+            <a:ext cx="4351320" cy="3566520"/>
           </a:xfrm>
           <a:prstGeom prst="rect">
             <a:avLst/>
@@ -4988,6 +4752,12 @@
             <a:miter/>
           </a:ln>
         </p:spPr>
+        <p:style>
+          <a:lnRef idx="0"/>
+          <a:fillRef idx="0"/>
+          <a:effectRef idx="0"/>
+          <a:fontRef idx="minor"/>
+        </p:style>
         <p:txBody>
           <a:bodyPr lIns="45720" rIns="45720" tIns="45000" bIns="45000"/>
           <a:p>
@@ -5010,10 +4780,7 @@
               <a:t>Team members:</a:t>
             </a:r>
             <a:endParaRPr b="0" lang="en-US" sz="2400" spc="-1" strike="noStrike">
-              <a:solidFill>
-                <a:srgbClr val="000000"/>
-              </a:solidFill>
-              <a:latin typeface="Calibri"/>
+              <a:latin typeface="Arial"/>
             </a:endParaRPr>
           </a:p>
           <a:p>
@@ -5036,10 +4803,7 @@
               <a:t>Veegish Ramdani</a:t>
             </a:r>
             <a:endParaRPr b="0" lang="en-US" sz="2200" spc="-1" strike="noStrike">
-              <a:solidFill>
-                <a:srgbClr val="000000"/>
-              </a:solidFill>
-              <a:latin typeface="Calibri"/>
+              <a:latin typeface="Arial"/>
             </a:endParaRPr>
           </a:p>
           <a:p>
@@ -5052,10 +4816,7 @@
               </a:spcBef>
             </a:pPr>
             <a:endParaRPr b="0" lang="en-US" sz="2200" spc="-1" strike="noStrike">
-              <a:solidFill>
-                <a:srgbClr val="000000"/>
-              </a:solidFill>
-              <a:latin typeface="Calibri"/>
+              <a:latin typeface="Arial"/>
             </a:endParaRPr>
           </a:p>
           <a:p>
@@ -5068,10 +4829,7 @@
               </a:spcBef>
             </a:pPr>
             <a:endParaRPr b="0" lang="en-US" sz="2200" spc="-1" strike="noStrike">
-              <a:solidFill>
-                <a:srgbClr val="000000"/>
-              </a:solidFill>
-              <a:latin typeface="Calibri"/>
+              <a:latin typeface="Arial"/>
             </a:endParaRPr>
           </a:p>
           <a:p>
@@ -5084,10 +4842,7 @@
               </a:spcBef>
             </a:pPr>
             <a:endParaRPr b="0" lang="en-US" sz="2200" spc="-1" strike="noStrike">
-              <a:solidFill>
-                <a:srgbClr val="000000"/>
-              </a:solidFill>
-              <a:latin typeface="Calibri"/>
+              <a:latin typeface="Arial"/>
             </a:endParaRPr>
           </a:p>
           <a:p>
@@ -5110,10 +4865,7 @@
               <a:t>First timers @ IETF/Hackathon:</a:t>
             </a:r>
             <a:endParaRPr b="0" lang="en-US" sz="1800" spc="-1" strike="noStrike">
-              <a:solidFill>
-                <a:srgbClr val="000000"/>
-              </a:solidFill>
-              <a:latin typeface="Calibri"/>
+              <a:latin typeface="Arial"/>
             </a:endParaRPr>
           </a:p>
           <a:p>
@@ -5136,10 +4888,7 @@
               <a:t>Rahul Kumar Shivadan</a:t>
             </a:r>
             <a:endParaRPr b="0" lang="en-US" sz="2200" spc="-1" strike="noStrike">
-              <a:solidFill>
-                <a:srgbClr val="000000"/>
-              </a:solidFill>
-              <a:latin typeface="Calibri"/>
+              <a:latin typeface="Arial"/>
             </a:endParaRPr>
           </a:p>
           <a:p>
@@ -5162,10 +4911,7 @@
               <a:t>Yashveer Jadoo</a:t>
             </a:r>
             <a:endParaRPr b="0" lang="en-US" sz="2400" spc="-1" strike="noStrike">
-              <a:solidFill>
-                <a:srgbClr val="000000"/>
-              </a:solidFill>
-              <a:latin typeface="Calibri"/>
+              <a:latin typeface="Arial"/>
             </a:endParaRPr>
           </a:p>
           <a:p>
@@ -5178,24 +4924,21 @@
               </a:spcBef>
             </a:pPr>
             <a:endParaRPr b="0" lang="en-US" sz="2400" spc="-1" strike="noStrike">
-              <a:solidFill>
-                <a:srgbClr val="000000"/>
-              </a:solidFill>
-              <a:latin typeface="Calibri"/>
-            </a:endParaRPr>
-          </a:p>
-        </p:txBody>
-      </p:sp>
-      <p:sp>
-        <p:nvSpPr>
-          <p:cNvPr id="101" name="TextShape 3"/>
-          <p:cNvSpPr txBox="1"/>
+              <a:latin typeface="Arial"/>
+            </a:endParaRPr>
+          </a:p>
+        </p:txBody>
+      </p:sp>
+      <p:sp>
+        <p:nvSpPr>
+          <p:cNvPr id="99" name="CustomShape 3"/>
+          <p:cNvSpPr/>
           <p:nvPr/>
         </p:nvSpPr>
         <p:spPr>
           <a:xfrm>
             <a:off x="8502840" y="4769640"/>
-            <a:ext cx="183600" cy="268920"/>
+            <a:ext cx="183240" cy="268560"/>
           </a:xfrm>
           <a:prstGeom prst="rect">
             <a:avLst/>
@@ -5205,6 +4948,12 @@
             <a:noFill/>
           </a:ln>
         </p:spPr>
+        <p:style>
+          <a:lnRef idx="0"/>
+          <a:fillRef idx="0"/>
+          <a:effectRef idx="0"/>
+          <a:fontRef idx="minor"/>
+        </p:style>
         <p:txBody>
           <a:bodyPr lIns="45720" rIns="45720" tIns="45000" bIns="45000" anchor="ctr"/>
           <a:p>
@@ -5213,7 +4962,7 @@
                 <a:spcPct val="100000"/>
               </a:lnSpc>
             </a:pPr>
-            <a:fld id="{C61515D9-0B06-4331-A36A-3BDCBCBBABDB}" type="slidenum">
+            <a:fld id="{AA9B260D-2B37-4D68-8A4D-B952ED655B2F}" type="slidenum">
               <a:rPr b="0" lang="en-US" sz="1200" spc="-1" strike="noStrike">
                 <a:solidFill>
                   <a:srgbClr val="888888"/>
@@ -5221,24 +4970,24 @@
                 <a:latin typeface="Calibri"/>
                 <a:ea typeface="Calibri"/>
               </a:rPr>
-              <a:t>1</a:t>
+              <a:t>&lt;number&gt;</a:t>
             </a:fld>
             <a:endParaRPr b="0" lang="en-US" sz="1200" spc="-1" strike="noStrike">
-              <a:latin typeface="Times New Roman"/>
-            </a:endParaRPr>
-          </a:p>
-        </p:txBody>
-      </p:sp>
-      <p:sp>
-        <p:nvSpPr>
-          <p:cNvPr id="102" name="CustomShape 4"/>
+              <a:latin typeface="Arial"/>
+            </a:endParaRPr>
+          </a:p>
+        </p:txBody>
+      </p:sp>
+      <p:sp>
+        <p:nvSpPr>
+          <p:cNvPr id="100" name="CustomShape 4"/>
           <p:cNvSpPr/>
           <p:nvPr/>
         </p:nvSpPr>
         <p:spPr>
           <a:xfrm>
             <a:off x="5019120" y="1162080"/>
-            <a:ext cx="3954960" cy="3592080"/>
+            <a:ext cx="3954600" cy="1764000"/>
           </a:xfrm>
           <a:prstGeom prst="rect">
             <a:avLst/>
@@ -5338,6 +5087,29 @@
           </a:p>
         </p:txBody>
       </p:sp>
+      <p:pic>
+        <p:nvPicPr>
+          <p:cNvPr id="101" name="" descr=""/>
+          <p:cNvPicPr/>
+          <p:nvPr/>
+        </p:nvPicPr>
+        <p:blipFill>
+          <a:blip r:embed="rId1"/>
+          <a:stretch/>
+        </p:blipFill>
+        <p:spPr>
+          <a:xfrm>
+            <a:off x="5081040" y="3139920"/>
+            <a:ext cx="3057120" cy="1523520"/>
+          </a:xfrm>
+          <a:prstGeom prst="rect">
+            <a:avLst/>
+          </a:prstGeom>
+          <a:ln>
+            <a:noFill/>
+          </a:ln>
+        </p:spPr>
+      </p:pic>
     </p:spTree>
   </p:cSld>
   <p:timing>

</xml_diff>